<commit_message>
add description, df output, fix hypotheses
</commit_message>
<xml_diff>
--- a/presentation.pptx
+++ b/presentation.pptx
@@ -3398,8 +3398,8 @@
         </p:nvSpPr>
         <p:spPr bwMode="auto">
           <a:xfrm flipH="0" flipV="0">
-            <a:off x="1105874" y="1752599"/>
-            <a:ext cx="10348829" cy="2103480"/>
+            <a:off x="1105873" y="1752598"/>
+            <a:ext cx="10349908" cy="2103480"/>
           </a:xfrm>
           <a:prstGeom prst="rect">
             <a:avLst/>
@@ -3417,7 +3417,7 @@
             <a:r>
               <a:rPr sz="6600" b="0" i="0" u="none">
                 <a:solidFill>
-                  <a:srgbClr val="1F1F1F"/>
+                  <a:schemeClr val="tx1"/>
                 </a:solidFill>
                 <a:latin typeface="Lohit Tamil Classical"/>
                 <a:ea typeface="Lohit Tamil Classical"/>
@@ -3428,7 +3428,7 @@
             <a:r>
               <a:rPr sz="6600" b="0" i="0" u="none">
                 <a:solidFill>
-                  <a:srgbClr val="1F1F1F"/>
+                  <a:schemeClr val="tx1"/>
                 </a:solidFill>
                 <a:latin typeface="Lohit Tamil Classical"/>
                 <a:ea typeface="Lohit Tamil Classical"/>
@@ -3438,7 +3438,7 @@
             </a:r>
             <a:endParaRPr sz="6600" b="0" i="0" u="none">
               <a:solidFill>
-                <a:srgbClr val="1F1F1F"/>
+                <a:schemeClr val="tx1"/>
               </a:solidFill>
               <a:latin typeface="Lohit Tamil Classical"/>
               <a:ea typeface="Lohit Tamil Classical"/>
@@ -3455,8 +3455,8 @@
         </p:nvSpPr>
         <p:spPr bwMode="auto">
           <a:xfrm flipH="0" flipV="0">
-            <a:off x="2778591" y="4272913"/>
-            <a:ext cx="7003395" cy="488039"/>
+            <a:off x="2778590" y="4272912"/>
+            <a:ext cx="7004114" cy="488039"/>
           </a:xfrm>
           <a:prstGeom prst="rect">
             <a:avLst/>
@@ -3474,18 +3474,29 @@
             <a:r>
               <a:rPr sz="2600" b="0" i="0" u="none">
                 <a:solidFill>
-                  <a:srgbClr val="1F1F1F"/>
-                </a:solidFill>
-                <a:latin typeface="Lohit Tamil Classical"/>
-                <a:ea typeface="Lohit Tamil Classical"/>
-                <a:cs typeface="Lohit Tamil Classical"/>
-              </a:rPr>
-              <a:t>Проект для задачи </a:t>
+                  <a:schemeClr val="tx1"/>
+                </a:solidFill>
+                <a:latin typeface="Lohit Tamil Classical"/>
+                <a:ea typeface="Lohit Tamil Classical"/>
+                <a:cs typeface="Lohit Tamil Classical"/>
+              </a:rPr>
+              <a:t>Проект </a:t>
             </a:r>
             <a:r>
               <a:rPr sz="2600" b="0" i="0" u="none">
                 <a:solidFill>
-                  <a:srgbClr val="1F1F1F"/>
+                  <a:schemeClr val="tx1"/>
+                </a:solidFill>
+                <a:latin typeface="Lohit Tamil Classical"/>
+                <a:ea typeface="Lohit Tamil Classical"/>
+                <a:cs typeface="Lohit Tamil Classical"/>
+              </a:rPr>
+              <a:t>для задачи </a:t>
+            </a:r>
+            <a:r>
+              <a:rPr sz="2600" b="0" i="0" u="none">
+                <a:solidFill>
+                  <a:schemeClr val="tx1"/>
                 </a:solidFill>
                 <a:latin typeface="Lohit Tamil Classical"/>
                 <a:ea typeface="Lohit Tamil Classical"/>
@@ -3495,7 +3506,7 @@
             </a:r>
             <a:endParaRPr sz="2600" b="0" i="0" u="none">
               <a:solidFill>
-                <a:srgbClr val="1F1F1F"/>
+                <a:schemeClr val="tx1"/>
               </a:solidFill>
               <a:latin typeface="Lohit Tamil Classical"/>
               <a:ea typeface="Lohit Tamil Classical"/>
@@ -3563,8 +3574,8 @@
         </p:nvSpPr>
         <p:spPr bwMode="auto">
           <a:xfrm flipH="0" flipV="0">
-            <a:off x="1105873" y="2457448"/>
-            <a:ext cx="10356748" cy="1097640"/>
+            <a:off x="1105872" y="2457447"/>
+            <a:ext cx="10357106" cy="1097640"/>
           </a:xfrm>
           <a:prstGeom prst="rect">
             <a:avLst/>
@@ -3582,7 +3593,7 @@
             <a:r>
               <a:rPr sz="6600" b="0" i="0" u="none">
                 <a:solidFill>
-                  <a:srgbClr val="1F1F1F"/>
+                  <a:schemeClr val="tx1"/>
                 </a:solidFill>
                 <a:latin typeface="Lohit Tamil Classical"/>
                 <a:ea typeface="Lohit Tamil Classical"/>
@@ -3592,7 +3603,7 @@
             </a:r>
             <a:endParaRPr sz="6600" b="0" i="0" u="none">
               <a:solidFill>
-                <a:srgbClr val="1F1F1F"/>
+                <a:schemeClr val="tx1"/>
               </a:solidFill>
               <a:latin typeface="Lohit Tamil Classical"/>
               <a:ea typeface="Lohit Tamil Classical"/>
@@ -3660,7 +3671,7 @@
         </p:nvSpPr>
         <p:spPr bwMode="auto">
           <a:xfrm flipH="0" flipV="0">
-            <a:off x="905848" y="838198"/>
+            <a:off x="905847" y="838197"/>
             <a:ext cx="5427989" cy="823319"/>
           </a:xfrm>
           <a:prstGeom prst="rect">
@@ -3678,6 +3689,9 @@
             </a:pPr>
             <a:r>
               <a:rPr sz="4800">
+                <a:solidFill>
+                  <a:schemeClr val="tx1"/>
+                </a:solidFill>
                 <a:latin typeface="Lohit Tamil Classical"/>
                 <a:ea typeface="Lohit Tamil Classical"/>
                 <a:cs typeface="Lohit Tamil Classical"/>
@@ -3685,6 +3699,9 @@
               <a:t>Описание задачи</a:t>
             </a:r>
             <a:endParaRPr sz="4800">
+              <a:solidFill>
+                <a:schemeClr val="tx1"/>
+              </a:solidFill>
               <a:latin typeface="Lohit Tamil Classical"/>
               <a:ea typeface="Lohit Tamil Classical"/>
               <a:cs typeface="Lohit Tamil Classical"/>
@@ -3700,8 +3717,8 @@
         </p:nvSpPr>
         <p:spPr bwMode="auto">
           <a:xfrm flipH="0" flipV="0">
-            <a:off x="905848" y="2158184"/>
-            <a:ext cx="7792890" cy="2019658"/>
+            <a:off x="905847" y="2158183"/>
+            <a:ext cx="7793609" cy="2019643"/>
           </a:xfrm>
           <a:prstGeom prst="rect">
             <a:avLst/>
@@ -3724,7 +3741,7 @@
             <a:r>
               <a:rPr sz="2200" b="0" i="0" u="none">
                 <a:solidFill>
-                  <a:srgbClr val="1F1F1F"/>
+                  <a:schemeClr val="tx1"/>
                 </a:solidFill>
                 <a:latin typeface="Lohit Tamil Classical"/>
                 <a:ea typeface="Lohit Tamil Classical"/>
@@ -3733,6 +3750,9 @@
               <a:t>Провести исследовательский анализ данных (EDA)</a:t>
             </a:r>
             <a:endParaRPr sz="2200">
+              <a:solidFill>
+                <a:schemeClr val="tx1"/>
+              </a:solidFill>
               <a:latin typeface="Lohit Tamil Classical"/>
               <a:cs typeface="Lohit Tamil Classical"/>
             </a:endParaRPr>
@@ -3749,7 +3769,7 @@
             <a:r>
               <a:rPr sz="2200" b="0" i="0" u="none">
                 <a:solidFill>
-                  <a:srgbClr val="1F1F1F"/>
+                  <a:schemeClr val="tx1"/>
                 </a:solidFill>
                 <a:latin typeface="Lohit Tamil Classical"/>
                 <a:ea typeface="Lohit Tamil Classical"/>
@@ -3758,6 +3778,9 @@
               <a:t>Создать расчёты</a:t>
             </a:r>
             <a:endParaRPr sz="2200">
+              <a:solidFill>
+                <a:schemeClr val="tx1"/>
+              </a:solidFill>
               <a:latin typeface="Lohit Tamil Classical"/>
               <a:cs typeface="Lohit Tamil Classical"/>
             </a:endParaRPr>
@@ -3774,7 +3797,7 @@
             <a:r>
               <a:rPr sz="2200" b="0" i="0" u="none">
                 <a:solidFill>
-                  <a:srgbClr val="1F1F1F"/>
+                  <a:schemeClr val="tx1"/>
                 </a:solidFill>
                 <a:latin typeface="Lohit Tamil Classical"/>
                 <a:ea typeface="Lohit Tamil Classical"/>
@@ -3783,6 +3806,9 @@
               <a:t>Выполнить проверку гипотез</a:t>
             </a:r>
             <a:endParaRPr sz="2200">
+              <a:solidFill>
+                <a:schemeClr val="tx1"/>
+              </a:solidFill>
               <a:latin typeface="Lohit Tamil Classical"/>
               <a:cs typeface="Lohit Tamil Classical"/>
             </a:endParaRPr>
@@ -3799,7 +3825,7 @@
             <a:r>
               <a:rPr sz="2200" b="0" i="0" u="none">
                 <a:solidFill>
-                  <a:srgbClr val="1F1F1F"/>
+                  <a:schemeClr val="tx1"/>
                 </a:solidFill>
                 <a:latin typeface="Lohit Tamil Classical"/>
                 <a:ea typeface="Lohit Tamil Classical"/>
@@ -3808,6 +3834,9 @@
               <a:t>Выполнить регрессионное моделирование</a:t>
             </a:r>
             <a:endParaRPr sz="2200">
+              <a:solidFill>
+                <a:schemeClr val="tx1"/>
+              </a:solidFill>
               <a:latin typeface="Lohit Tamil Classical"/>
               <a:cs typeface="Lohit Tamil Classical"/>
             </a:endParaRPr>
@@ -3824,7 +3853,7 @@
             <a:r>
               <a:rPr sz="2200" b="0" i="0" u="none">
                 <a:solidFill>
-                  <a:srgbClr val="1F1F1F"/>
+                  <a:schemeClr val="tx1"/>
                 </a:solidFill>
                 <a:latin typeface="Lohit Tamil Classical"/>
                 <a:ea typeface="Lohit Tamil Classical"/>
@@ -3833,6 +3862,9 @@
               <a:t>Создать дашборд по результатам работы</a:t>
             </a:r>
             <a:endParaRPr sz="2200">
+              <a:solidFill>
+                <a:schemeClr val="tx1"/>
+              </a:solidFill>
               <a:latin typeface="Lohit Tamil Classical"/>
               <a:cs typeface="Lohit Tamil Classical"/>
             </a:endParaRPr>
@@ -3898,7 +3930,7 @@
         </p:nvSpPr>
         <p:spPr bwMode="auto">
           <a:xfrm flipH="0" flipV="0">
-            <a:off x="905848" y="838198"/>
+            <a:off x="905847" y="838197"/>
             <a:ext cx="1352788" cy="823319"/>
           </a:xfrm>
           <a:prstGeom prst="rect">
@@ -3916,6 +3948,9 @@
             </a:pPr>
             <a:r>
               <a:rPr sz="4800">
+                <a:solidFill>
+                  <a:schemeClr val="tx1"/>
+                </a:solidFill>
                 <a:latin typeface="Lohit Tamil Classical"/>
                 <a:ea typeface="Lohit Tamil Classical"/>
                 <a:cs typeface="Lohit Tamil Classical"/>
@@ -3938,8 +3973,8 @@
         </p:nvSpPr>
         <p:spPr bwMode="auto">
           <a:xfrm flipH="0" flipV="0">
-            <a:off x="905848" y="2158184"/>
-            <a:ext cx="9020895" cy="2019658"/>
+            <a:off x="905846" y="2158182"/>
+            <a:ext cx="9025573" cy="2019643"/>
           </a:xfrm>
           <a:prstGeom prst="rect">
             <a:avLst/>
@@ -3962,7 +3997,7 @@
             <a:r>
               <a:rPr sz="2200" b="0" i="0" u="none">
                 <a:solidFill>
-                  <a:srgbClr val="1F1F1F"/>
+                  <a:schemeClr val="tx1"/>
                 </a:solidFill>
                 <a:latin typeface="Lohit Tamil Classical"/>
                 <a:ea typeface="Lohit Tamil Classical"/>
@@ -3971,6 +4006,9 @@
               <a:t>Не учитывали дни, когда измерения не проводились</a:t>
             </a:r>
             <a:endParaRPr sz="2200">
+              <a:solidFill>
+                <a:schemeClr val="tx1"/>
+              </a:solidFill>
               <a:latin typeface="Lohit Tamil Classical"/>
               <a:cs typeface="Lohit Tamil Classical"/>
             </a:endParaRPr>
@@ -3987,7 +4025,7 @@
             <a:r>
               <a:rPr sz="2200" b="0" i="0" u="none">
                 <a:solidFill>
-                  <a:srgbClr val="1F1F1F"/>
+                  <a:schemeClr val="tx1"/>
                 </a:solidFill>
                 <a:latin typeface="Lohit Tamil Classical"/>
                 <a:ea typeface="Lohit Tamil Classical"/>
@@ -3996,6 +4034,9 @@
               <a:t>Привели номер смены к целочисленному типу</a:t>
             </a:r>
             <a:endParaRPr sz="2200">
+              <a:solidFill>
+                <a:schemeClr val="tx1"/>
+              </a:solidFill>
               <a:latin typeface="Lohit Tamil Classical"/>
               <a:cs typeface="Lohit Tamil Classical"/>
             </a:endParaRPr>
@@ -4012,15 +4053,62 @@
             <a:r>
               <a:rPr sz="2200" b="0" i="0" u="none">
                 <a:solidFill>
-                  <a:srgbClr val="1F1F1F"/>
-                </a:solidFill>
-                <a:latin typeface="Lohit Tamil Classical"/>
-                <a:ea typeface="Lohit Tamil Classical"/>
-                <a:cs typeface="Lohit Tamil Classical"/>
-              </a:rPr>
-              <a:t>Создали новые колонки дня и месяца для более удобной работы с датами</a:t>
+                  <a:schemeClr val="tx1"/>
+                </a:solidFill>
+                <a:latin typeface="Lohit Tamil Classical"/>
+                <a:ea typeface="Lohit Tamil Classical"/>
+                <a:cs typeface="Lohit Tamil Classical"/>
+              </a:rPr>
+              <a:t>Создал</a:t>
+            </a:r>
+            <a:r>
+              <a:rPr sz="2200" b="0" i="0" u="none">
+                <a:solidFill>
+                  <a:schemeClr val="tx1"/>
+                </a:solidFill>
+                <a:latin typeface="Lohit Tamil Classical"/>
+                <a:ea typeface="Lohit Tamil Classical"/>
+                <a:cs typeface="Lohit Tamil Classical"/>
+              </a:rPr>
+              <a:t>и новые колонки дня и месяца для более удобной работы с</a:t>
+            </a:r>
+            <a:r>
+              <a:rPr sz="2200" b="0" i="0" u="none">
+                <a:solidFill>
+                  <a:schemeClr val="tx1"/>
+                </a:solidFill>
+                <a:latin typeface="Lohit Tamil Classical"/>
+                <a:ea typeface="Lohit Tamil Classical"/>
+                <a:cs typeface="Lohit Tamil Classical"/>
+              </a:rPr>
+              <a:t> </a:t>
+            </a:r>
+            <a:r>
+              <a:rPr sz="2200" b="0" i="0" u="none">
+                <a:solidFill>
+                  <a:schemeClr val="tx1"/>
+                </a:solidFill>
+                <a:latin typeface="Lohit Tamil Classical"/>
+                <a:ea typeface="Lohit Tamil Classical"/>
+                <a:cs typeface="Lohit Tamil Classical"/>
+              </a:rPr>
+              <a:t>да</a:t>
+            </a:r>
+            <a:r>
+              <a:rPr sz="2200" b="0" i="0" u="none">
+                <a:solidFill>
+                  <a:schemeClr val="tx1"/>
+                </a:solidFill>
+                <a:latin typeface="Lohit Tamil Classical"/>
+                <a:ea typeface="Lohit Tamil Classical"/>
+                <a:cs typeface="Lohit Tamil Classical"/>
+              </a:rPr>
+              <a:t>тами</a:t>
             </a:r>
             <a:endParaRPr sz="2200">
+              <a:solidFill>
+                <a:schemeClr val="tx1"/>
+              </a:solidFill>
               <a:latin typeface="Lohit Tamil Classical"/>
               <a:cs typeface="Lohit Tamil Classical"/>
             </a:endParaRPr>
@@ -4036,6 +4124,9 @@
             </a:pPr>
             <a:r>
               <a:rPr sz="2200">
+                <a:solidFill>
+                  <a:schemeClr val="tx1"/>
+                </a:solidFill>
                 <a:latin typeface="Lohit Tamil Classical"/>
                 <a:ea typeface="Lohit Tamil Classical"/>
                 <a:cs typeface="Lohit Tamil Classical"/>
@@ -4108,7 +4199,7 @@
         </p:nvSpPr>
         <p:spPr bwMode="auto">
           <a:xfrm flipH="0" flipV="0">
-            <a:off x="905848" y="838198"/>
+            <a:off x="905847" y="838197"/>
             <a:ext cx="2646402" cy="823319"/>
           </a:xfrm>
           <a:prstGeom prst="rect">
@@ -4126,6 +4217,9 @@
             </a:pPr>
             <a:r>
               <a:rPr sz="4800">
+                <a:solidFill>
+                  <a:schemeClr val="tx1"/>
+                </a:solidFill>
                 <a:latin typeface="Lohit Tamil Classical"/>
                 <a:ea typeface="Lohit Tamil Classical"/>
                 <a:cs typeface="Lohit Tamil Classical"/>
@@ -4148,8 +4242,8 @@
         </p:nvSpPr>
         <p:spPr bwMode="auto">
           <a:xfrm flipH="0" flipV="0">
-            <a:off x="905847" y="2158183"/>
-            <a:ext cx="9014039" cy="2790780"/>
+            <a:off x="905845" y="2158182"/>
+            <a:ext cx="9326776" cy="2790780"/>
           </a:xfrm>
           <a:prstGeom prst="rect">
             <a:avLst/>
@@ -4171,6 +4265,9 @@
             </a:pPr>
             <a:r>
               <a:rPr sz="2200">
+                <a:solidFill>
+                  <a:schemeClr val="tx1"/>
+                </a:solidFill>
                 <a:latin typeface="Lohit Tamil Classical"/>
                 <a:ea typeface="Lohit Tamil Classical"/>
                 <a:cs typeface="Lohit Tamil Classical"/>
@@ -4180,7 +4277,7 @@
             <a:r>
               <a:rPr lang="ru-RU" sz="2200" b="0" i="0" u="none" strike="noStrike" cap="none" spc="0">
                 <a:solidFill>
-                  <a:srgbClr val="000000"/>
+                  <a:schemeClr val="tx1"/>
                 </a:solidFill>
                 <a:latin typeface="Lohit Tamil Classical"/>
                 <a:ea typeface="Lohit Tamil Classical"/>
@@ -4190,13 +4287,217 @@
             </a:r>
             <a:r>
               <a:rPr sz="2200">
-                <a:latin typeface="Lohit Tamil Classical"/>
-                <a:ea typeface="Lohit Tamil Classical"/>
-                <a:cs typeface="Lohit Tamil Classical"/>
-              </a:rPr>
-              <a:t>: 1 - меньше 5%, 2 - от 5% до 16%, 3 - больше 16%</a:t>
+                <a:solidFill>
+                  <a:schemeClr val="tx1"/>
+                </a:solidFill>
+                <a:latin typeface="Lohit Tamil Classical"/>
+                <a:ea typeface="Lohit Tamil Classical"/>
+                <a:cs typeface="Lohit Tamil Classical"/>
+              </a:rPr>
+              <a:t>: 1</a:t>
+            </a:r>
+            <a:r>
+              <a:rPr lang="ru-RU" sz="2200" b="0" i="0" u="none" strike="noStrike" cap="none" spc="0">
+                <a:solidFill>
+                  <a:schemeClr val="tx1"/>
+                </a:solidFill>
+                <a:latin typeface="Lohit Tamil Classical"/>
+                <a:ea typeface="Lohit Tamil Classical"/>
+                <a:cs typeface="Lohit Tamil Classical"/>
+              </a:rPr>
+              <a:t> </a:t>
+            </a:r>
+            <a:r>
+              <a:rPr sz="2200">
+                <a:solidFill>
+                  <a:schemeClr val="tx1"/>
+                </a:solidFill>
+                <a:latin typeface="Lohit Tamil Classical"/>
+                <a:ea typeface="Lohit Tamil Classical"/>
+                <a:cs typeface="Lohit Tamil Classical"/>
+              </a:rPr>
+              <a:t>-</a:t>
+            </a:r>
+            <a:r>
+              <a:rPr lang="ru-RU" sz="2200" b="0" i="0" u="none" strike="noStrike" cap="none" spc="0">
+                <a:solidFill>
+                  <a:schemeClr val="tx1"/>
+                </a:solidFill>
+                <a:latin typeface="Lohit Tamil Classical"/>
+                <a:ea typeface="Lohit Tamil Classical"/>
+                <a:cs typeface="Lohit Tamil Classical"/>
+              </a:rPr>
+              <a:t> </a:t>
+            </a:r>
+            <a:r>
+              <a:rPr sz="2200">
+                <a:solidFill>
+                  <a:schemeClr val="tx1"/>
+                </a:solidFill>
+                <a:latin typeface="Lohit Tamil Classical"/>
+                <a:ea typeface="Lohit Tamil Classical"/>
+                <a:cs typeface="Lohit Tamil Classical"/>
+              </a:rPr>
+              <a:t>меньше 5%, 2</a:t>
+            </a:r>
+            <a:r>
+              <a:rPr lang="ru-RU" sz="2200" b="0" i="0" u="none" strike="noStrike" cap="none" spc="0">
+                <a:solidFill>
+                  <a:schemeClr val="tx1"/>
+                </a:solidFill>
+                <a:latin typeface="Lohit Tamil Classical"/>
+                <a:ea typeface="Lohit Tamil Classical"/>
+                <a:cs typeface="Lohit Tamil Classical"/>
+              </a:rPr>
+              <a:t> </a:t>
+            </a:r>
+            <a:r>
+              <a:rPr sz="2200">
+                <a:solidFill>
+                  <a:schemeClr val="tx1"/>
+                </a:solidFill>
+                <a:latin typeface="Lohit Tamil Classical"/>
+                <a:ea typeface="Lohit Tamil Classical"/>
+                <a:cs typeface="Lohit Tamil Classical"/>
+              </a:rPr>
+              <a:t>-</a:t>
+            </a:r>
+            <a:r>
+              <a:rPr lang="ru-RU" sz="2200" b="0" i="0" u="none" strike="noStrike" cap="none" spc="0">
+                <a:solidFill>
+                  <a:schemeClr val="tx1"/>
+                </a:solidFill>
+                <a:latin typeface="Lohit Tamil Classical"/>
+                <a:ea typeface="Lohit Tamil Classical"/>
+                <a:cs typeface="Lohit Tamil Classical"/>
+              </a:rPr>
+              <a:t> </a:t>
+            </a:r>
+            <a:r>
+              <a:rPr sz="2200">
+                <a:solidFill>
+                  <a:schemeClr val="tx1"/>
+                </a:solidFill>
+                <a:latin typeface="Lohit Tamil Classical"/>
+                <a:ea typeface="Lohit Tamil Classical"/>
+                <a:cs typeface="Lohit Tamil Classical"/>
+              </a:rPr>
+              <a:t>от</a:t>
+            </a:r>
+            <a:r>
+              <a:rPr lang="ru-RU" sz="2200" b="0" i="0" u="none" strike="noStrike" cap="none" spc="0">
+                <a:solidFill>
+                  <a:schemeClr val="tx1"/>
+                </a:solidFill>
+                <a:latin typeface="Lohit Tamil Classical"/>
+                <a:ea typeface="Lohit Tamil Classical"/>
+                <a:cs typeface="Lohit Tamil Classical"/>
+              </a:rPr>
+              <a:t> </a:t>
+            </a:r>
+            <a:r>
+              <a:rPr sz="2200">
+                <a:solidFill>
+                  <a:schemeClr val="tx1"/>
+                </a:solidFill>
+                <a:latin typeface="Lohit Tamil Classical"/>
+                <a:ea typeface="Lohit Tamil Classical"/>
+                <a:cs typeface="Lohit Tamil Classical"/>
+              </a:rPr>
+              <a:t>5%</a:t>
+            </a:r>
+            <a:r>
+              <a:rPr lang="ru-RU" sz="2200" b="0" i="0" u="none" strike="noStrike" cap="none" spc="0">
+                <a:solidFill>
+                  <a:schemeClr val="tx1"/>
+                </a:solidFill>
+                <a:latin typeface="Lohit Tamil Classical"/>
+                <a:ea typeface="Lohit Tamil Classical"/>
+                <a:cs typeface="Lohit Tamil Classical"/>
+              </a:rPr>
+              <a:t> </a:t>
+            </a:r>
+            <a:r>
+              <a:rPr sz="2200">
+                <a:solidFill>
+                  <a:schemeClr val="tx1"/>
+                </a:solidFill>
+                <a:latin typeface="Lohit Tamil Classical"/>
+                <a:ea typeface="Lohit Tamil Classical"/>
+                <a:cs typeface="Lohit Tamil Classical"/>
+              </a:rPr>
+              <a:t>до</a:t>
+            </a:r>
+            <a:r>
+              <a:rPr lang="ru-RU" sz="2200" b="0" i="0" u="none" strike="noStrike" cap="none" spc="0">
+                <a:solidFill>
+                  <a:schemeClr val="tx1"/>
+                </a:solidFill>
+                <a:latin typeface="Lohit Tamil Classical"/>
+                <a:ea typeface="Lohit Tamil Classical"/>
+                <a:cs typeface="Lohit Tamil Classical"/>
+              </a:rPr>
+              <a:t> </a:t>
+            </a:r>
+            <a:r>
+              <a:rPr sz="2200">
+                <a:solidFill>
+                  <a:schemeClr val="tx1"/>
+                </a:solidFill>
+                <a:latin typeface="Lohit Tamil Classical"/>
+                <a:ea typeface="Lohit Tamil Classical"/>
+                <a:cs typeface="Lohit Tamil Classical"/>
+              </a:rPr>
+              <a:t>16%, 3</a:t>
+            </a:r>
+            <a:r>
+              <a:rPr lang="ru-RU" sz="2200" b="0" i="0" u="none" strike="noStrike" cap="none" spc="0">
+                <a:solidFill>
+                  <a:schemeClr val="tx1"/>
+                </a:solidFill>
+                <a:latin typeface="Lohit Tamil Classical"/>
+                <a:ea typeface="Lohit Tamil Classical"/>
+                <a:cs typeface="Lohit Tamil Classical"/>
+              </a:rPr>
+              <a:t> </a:t>
+            </a:r>
+            <a:r>
+              <a:rPr sz="2200">
+                <a:solidFill>
+                  <a:schemeClr val="tx1"/>
+                </a:solidFill>
+                <a:latin typeface="Lohit Tamil Classical"/>
+                <a:ea typeface="Lohit Tamil Classical"/>
+                <a:cs typeface="Lohit Tamil Classical"/>
+              </a:rPr>
+              <a:t>-</a:t>
+            </a:r>
+            <a:r>
+              <a:rPr lang="ru-RU" sz="2200" b="0" i="0" u="none" strike="noStrike" cap="none" spc="0">
+                <a:solidFill>
+                  <a:schemeClr val="tx1"/>
+                </a:solidFill>
+                <a:latin typeface="Lohit Tamil Classical"/>
+                <a:ea typeface="Lohit Tamil Classical"/>
+                <a:cs typeface="Lohit Tamil Classical"/>
+              </a:rPr>
+              <a:t> </a:t>
+            </a:r>
+            <a:r>
+              <a:rPr sz="2200">
+                <a:solidFill>
+                  <a:schemeClr val="tx1"/>
+                </a:solidFill>
+                <a:latin typeface="Lohit Tamil Classical"/>
+                <a:ea typeface="Lohit Tamil Classical"/>
+                <a:cs typeface="Lohit Tamil Classical"/>
+              </a:rPr>
+              <a:t>больше 16%</a:t>
             </a:r>
             <a:endParaRPr sz="2200">
+              <a:solidFill>
+                <a:schemeClr val="tx1"/>
+              </a:solidFill>
               <a:latin typeface="Lohit Tamil Classical"/>
               <a:ea typeface="Lohit Tamil Classical"/>
               <a:cs typeface="Lohit Tamil Classical"/>
@@ -4213,6 +4514,9 @@
             </a:pPr>
             <a:r>
               <a:rPr sz="2200">
+                <a:solidFill>
+                  <a:schemeClr val="tx1"/>
+                </a:solidFill>
                 <a:latin typeface="Lohit Tamil Classical"/>
                 <a:ea typeface="Lohit Tamil Classical"/>
                 <a:cs typeface="Lohit Tamil Classical"/>
@@ -4221,32 +4525,117 @@
             </a:r>
             <a:r>
               <a:rPr sz="2200">
-                <a:latin typeface="Lohit Tamil Classical"/>
-                <a:ea typeface="Lohit Tamil Classical"/>
-                <a:cs typeface="Lohit Tamil Classical"/>
-              </a:rPr>
-              <a:t>гда ресурсов тратится больше, например          </a:t>
-            </a:r>
+                <a:solidFill>
+                  <a:schemeClr val="tx1"/>
+                </a:solidFill>
+                <a:latin typeface="Lohit Tamil Classical"/>
+                <a:ea typeface="Lohit Tamil Classical"/>
+                <a:cs typeface="Lohit Tamil Classical"/>
+              </a:rPr>
+              <a:t>гда ресурсов тратится больше, например</a:t>
+            </a:r>
+            <a:br>
+              <a:rPr sz="2200">
+                <a:solidFill>
+                  <a:schemeClr val="tx1"/>
+                </a:solidFill>
+                <a:latin typeface="Lohit Tamil Classical"/>
+                <a:ea typeface="Lohit Tamil Classical"/>
+                <a:cs typeface="Lohit Tamil Classical"/>
+              </a:rPr>
+            </a:br>
             <a:r>
               <a:rPr sz="2200" b="0" i="0" u="none">
                 <a:solidFill>
-                  <a:srgbClr val="1F1F1F"/>
-                </a:solidFill>
-                <a:latin typeface="Lohit Tamil Classical"/>
-                <a:ea typeface="Lohit Tamil Classical"/>
-                <a:cs typeface="Lohit Tamil Classical"/>
-              </a:rPr>
-              <a:t>     6-7 февраля 2021</a:t>
+                  <a:schemeClr val="tx1"/>
+                </a:solidFill>
+                <a:latin typeface="Lohit Tamil Classical"/>
+                <a:ea typeface="Lohit Tamil Classical"/>
+                <a:cs typeface="Lohit Tamil Classical"/>
+              </a:rPr>
+              <a:t>6-</a:t>
+            </a:r>
+            <a:r>
+              <a:rPr sz="2200" b="0" i="0" u="none">
+                <a:solidFill>
+                  <a:schemeClr val="tx1"/>
+                </a:solidFill>
+                <a:latin typeface="Lohit Tamil Classical"/>
+                <a:ea typeface="Lohit Tamil Classical"/>
+                <a:cs typeface="Lohit Tamil Classical"/>
+              </a:rPr>
+              <a:t>7</a:t>
+            </a:r>
+            <a:r>
+              <a:rPr lang="ru-RU" sz="2200" b="0" i="0" u="none" strike="noStrike" cap="none" spc="0">
+                <a:solidFill>
+                  <a:schemeClr val="tx1"/>
+                </a:solidFill>
+                <a:latin typeface="Lohit Tamil Classical"/>
+                <a:ea typeface="Lohit Tamil Classical"/>
+                <a:cs typeface="Lohit Tamil Classical"/>
+              </a:rPr>
+              <a:t> </a:t>
+            </a:r>
+            <a:r>
+              <a:rPr sz="2200" b="0" i="0" u="none">
+                <a:solidFill>
+                  <a:schemeClr val="tx1"/>
+                </a:solidFill>
+                <a:latin typeface="Lohit Tamil Classical"/>
+                <a:ea typeface="Lohit Tamil Classical"/>
+                <a:cs typeface="Lohit Tamil Classical"/>
+              </a:rPr>
+              <a:t>февраля</a:t>
+            </a:r>
+            <a:r>
+              <a:rPr lang="ru-RU" sz="2200" b="0" i="0" u="none" strike="noStrike" cap="none" spc="0">
+                <a:solidFill>
+                  <a:schemeClr val="tx1"/>
+                </a:solidFill>
+                <a:latin typeface="Lohit Tamil Classical"/>
+                <a:ea typeface="Lohit Tamil Classical"/>
+                <a:cs typeface="Lohit Tamil Classical"/>
+              </a:rPr>
+              <a:t> </a:t>
+            </a:r>
+            <a:r>
+              <a:rPr sz="2200" b="0" i="0" u="none">
+                <a:solidFill>
+                  <a:schemeClr val="tx1"/>
+                </a:solidFill>
+                <a:latin typeface="Lohit Tamil Classical"/>
+                <a:ea typeface="Lohit Tamil Classical"/>
+                <a:cs typeface="Lohit Tamil Classical"/>
+              </a:rPr>
+              <a:t>2021</a:t>
+            </a:r>
+            <a:r>
+              <a:rPr lang="ru-RU" sz="2200" b="0" i="0" u="none" strike="noStrike" cap="none" spc="0">
+                <a:solidFill>
+                  <a:schemeClr val="tx1"/>
+                </a:solidFill>
+                <a:latin typeface="Lohit Tamil Classical"/>
+                <a:ea typeface="Lohit Tamil Classical"/>
+                <a:cs typeface="Lohit Tamil Classical"/>
+              </a:rPr>
+              <a:t> </a:t>
             </a:r>
             <a:r>
               <a:rPr sz="2200">
-                <a:latin typeface="Lohit Tamil Classical"/>
-                <a:ea typeface="Lohit Tamil Classical"/>
-                <a:cs typeface="Lohit Tamil Classical"/>
-              </a:rPr>
-              <a:t> года</a:t>
+                <a:solidFill>
+                  <a:schemeClr val="tx1"/>
+                </a:solidFill>
+                <a:latin typeface="Lohit Tamil Classical"/>
+                <a:ea typeface="Lohit Tamil Classical"/>
+                <a:cs typeface="Lohit Tamil Classical"/>
+              </a:rPr>
+              <a:t>года</a:t>
             </a:r>
             <a:endParaRPr sz="2200">
+              <a:solidFill>
+                <a:schemeClr val="tx1"/>
+              </a:solidFill>
               <a:latin typeface="Lohit Tamil Classical"/>
               <a:ea typeface="Lohit Tamil Classical"/>
               <a:cs typeface="Lohit Tamil Classical"/>
@@ -4263,14 +4652,86 @@
             </a:pPr>
             <a:r>
               <a:rPr sz="2200">
-                <a:latin typeface="Lohit Tamil Classical"/>
-                <a:ea typeface="Lohit Tamil Classical"/>
-                <a:cs typeface="Lohit Tamil Classical"/>
-              </a:rPr>
-              <a:t>Почти каждый месяц категория опасности вредного газа в среднем равна 3 (больше 16%), за исключение</a:t>
+                <a:solidFill>
+                  <a:schemeClr val="tx1"/>
+                </a:solidFill>
+                <a:latin typeface="Lohit Tamil Classical"/>
+                <a:ea typeface="Lohit Tamil Classical"/>
+                <a:cs typeface="Lohit Tamil Classical"/>
+              </a:rPr>
+              <a:t>Почти каждый месяц категория опасности вредного газа в</a:t>
+            </a:r>
+            <a:r>
+              <a:rPr lang="ru-RU" sz="2200" b="0" i="0" u="none" strike="noStrike" cap="none" spc="0">
+                <a:solidFill>
+                  <a:schemeClr val="tx1"/>
+                </a:solidFill>
+                <a:latin typeface="Lohit Tamil Classical"/>
+                <a:ea typeface="Lohit Tamil Classical"/>
+                <a:cs typeface="Lohit Tamil Classical"/>
+              </a:rPr>
+              <a:t> </a:t>
             </a:r>
             <a:r>
               <a:rPr sz="2200">
+                <a:solidFill>
+                  <a:schemeClr val="tx1"/>
+                </a:solidFill>
+                <a:latin typeface="Lohit Tamil Classical"/>
+                <a:ea typeface="Lohit Tamil Classical"/>
+                <a:cs typeface="Lohit Tamil Classical"/>
+              </a:rPr>
+              <a:t>среднем равна</a:t>
+            </a:r>
+            <a:r>
+              <a:rPr lang="ru-RU" sz="2200" b="0" i="0" u="none" strike="noStrike" cap="none" spc="0">
+                <a:solidFill>
+                  <a:schemeClr val="tx1"/>
+                </a:solidFill>
+                <a:latin typeface="Lohit Tamil Classical"/>
+                <a:ea typeface="Lohit Tamil Classical"/>
+                <a:cs typeface="Lohit Tamil Classical"/>
+              </a:rPr>
+              <a:t> </a:t>
+            </a:r>
+            <a:r>
+              <a:rPr sz="2200">
+                <a:solidFill>
+                  <a:schemeClr val="tx1"/>
+                </a:solidFill>
+                <a:latin typeface="Lohit Tamil Classical"/>
+                <a:ea typeface="Lohit Tamil Classical"/>
+                <a:cs typeface="Lohit Tamil Classical"/>
+              </a:rPr>
+              <a:t>3 (больше 16%), за</a:t>
+            </a:r>
+            <a:r>
+              <a:rPr lang="ru-RU" sz="2200" b="0" i="0" u="none" strike="noStrike" cap="none" spc="0">
+                <a:solidFill>
+                  <a:schemeClr val="tx1"/>
+                </a:solidFill>
+                <a:latin typeface="Lohit Tamil Classical"/>
+                <a:ea typeface="Lohit Tamil Classical"/>
+                <a:cs typeface="Lohit Tamil Classical"/>
+              </a:rPr>
+              <a:t> </a:t>
+            </a:r>
+            <a:r>
+              <a:rPr sz="2200">
+                <a:solidFill>
+                  <a:schemeClr val="tx1"/>
+                </a:solidFill>
+                <a:latin typeface="Lohit Tamil Classical"/>
+                <a:ea typeface="Lohit Tamil Classical"/>
+                <a:cs typeface="Lohit Tamil Classical"/>
+              </a:rPr>
+              <a:t>исключение</a:t>
+            </a:r>
+            <a:r>
+              <a:rPr sz="2200">
+                <a:solidFill>
+                  <a:schemeClr val="tx1"/>
+                </a:solidFill>
                 <a:latin typeface="Lohit Tamil Classical"/>
                 <a:ea typeface="Lohit Tamil Classical"/>
                 <a:cs typeface="Lohit Tamil Classical"/>
@@ -4280,7 +4741,7 @@
             <a:r>
               <a:rPr sz="2200" b="0" i="0" u="none">
                 <a:solidFill>
-                  <a:srgbClr val="1F1F1F"/>
+                  <a:schemeClr val="tx1"/>
                 </a:solidFill>
                 <a:latin typeface="Lohit Tamil Classical"/>
                 <a:ea typeface="Lohit Tamil Classical"/>
@@ -4289,14 +4750,53 @@
               <a:t>сентября-ноября 2022</a:t>
             </a:r>
             <a:r>
+              <a:rPr lang="ru-RU" sz="2200" b="0" i="0" u="none" strike="noStrike" cap="none" spc="0">
+                <a:solidFill>
+                  <a:schemeClr val="tx1"/>
+                </a:solidFill>
+                <a:latin typeface="Lohit Tamil Classical"/>
+                <a:ea typeface="Lohit Tamil Classical"/>
+                <a:cs typeface="Lohit Tamil Classical"/>
+              </a:rPr>
+              <a:t> </a:t>
+            </a:r>
+            <a:r>
               <a:rPr sz="2200">
-                <a:latin typeface="Lohit Tamil Classical"/>
-                <a:ea typeface="Lohit Tamil Classical"/>
-                <a:cs typeface="Lohit Tamil Classical"/>
-              </a:rPr>
-              <a:t> года (2 категория)</a:t>
+                <a:solidFill>
+                  <a:schemeClr val="tx1"/>
+                </a:solidFill>
+                <a:latin typeface="Lohit Tamil Classical"/>
+                <a:ea typeface="Lohit Tamil Classical"/>
+                <a:cs typeface="Lohit Tamil Classical"/>
+              </a:rPr>
+              <a:t>года (2</a:t>
+            </a:r>
+            <a:r>
+              <a:rPr lang="ru-RU" sz="2200" b="0" i="0" u="none" strike="noStrike" cap="none" spc="0">
+                <a:solidFill>
+                  <a:schemeClr val="tx1"/>
+                </a:solidFill>
+                <a:latin typeface="Lohit Tamil Classical"/>
+                <a:ea typeface="Lohit Tamil Classical"/>
+                <a:cs typeface="Lohit Tamil Classical"/>
+              </a:rPr>
+              <a:t> </a:t>
+            </a:r>
+            <a:r>
+              <a:rPr sz="2200">
+                <a:solidFill>
+                  <a:schemeClr val="tx1"/>
+                </a:solidFill>
+                <a:latin typeface="Lohit Tamil Classical"/>
+                <a:ea typeface="Lohit Tamil Classical"/>
+                <a:cs typeface="Lohit Tamil Classical"/>
+              </a:rPr>
+              <a:t>категория)</a:t>
             </a:r>
             <a:endParaRPr sz="2200">
+              <a:solidFill>
+                <a:schemeClr val="tx1"/>
+              </a:solidFill>
               <a:latin typeface="Lohit Tamil Classical"/>
               <a:cs typeface="Lohit Tamil Classical"/>
             </a:endParaRPr>
@@ -4362,7 +4862,7 @@
         </p:nvSpPr>
         <p:spPr bwMode="auto">
           <a:xfrm flipH="0" flipV="0">
-            <a:off x="905848" y="838198"/>
+            <a:off x="905847" y="838197"/>
             <a:ext cx="2646402" cy="823319"/>
           </a:xfrm>
           <a:prstGeom prst="rect">
@@ -4380,6 +4880,9 @@
             </a:pPr>
             <a:r>
               <a:rPr sz="4800">
+                <a:solidFill>
+                  <a:schemeClr val="tx1"/>
+                </a:solidFill>
                 <a:latin typeface="Lohit Tamil Classical"/>
                 <a:ea typeface="Lohit Tamil Classical"/>
                 <a:cs typeface="Lohit Tamil Classical"/>
@@ -4402,8 +4905,8 @@
         </p:nvSpPr>
         <p:spPr bwMode="auto">
           <a:xfrm flipH="0" flipV="0">
-            <a:off x="905848" y="2158184"/>
-            <a:ext cx="9065880" cy="2557610"/>
+            <a:off x="905845" y="2158182"/>
+            <a:ext cx="9071997" cy="2557611"/>
           </a:xfrm>
           <a:prstGeom prst="rect">
             <a:avLst/>
@@ -4426,18 +4929,40 @@
             <a:r>
               <a:rPr lang="ru-RU" sz="2200" b="0" i="0" u="none" strike="noStrike" cap="none" spc="0">
                 <a:solidFill>
-                  <a:srgbClr val="000000"/>
-                </a:solidFill>
-                <a:latin typeface="Lohit Tamil Classical"/>
-                <a:ea typeface="Lohit Tamil Classical"/>
-                <a:cs typeface="Lohit Tamil Classical"/>
-              </a:rPr>
-              <a:t>Изучили, как меняются средние значения входных и выходных параметров в зависимости от </a:t>
+                  <a:schemeClr val="tx1"/>
+                </a:solidFill>
+                <a:latin typeface="Lohit Tamil Classical"/>
+                <a:ea typeface="Lohit Tamil Classical"/>
+                <a:cs typeface="Lohit Tamil Classical"/>
+              </a:rPr>
+              <a:t>Изучили, как меняются средние значения входных и</a:t>
             </a:r>
             <a:r>
               <a:rPr lang="ru-RU" sz="2200" b="0" i="0" u="none" strike="noStrike" cap="none" spc="0">
                 <a:solidFill>
-                  <a:srgbClr val="000000"/>
+                  <a:schemeClr val="tx1"/>
+                </a:solidFill>
+                <a:latin typeface="Lohit Tamil Classical"/>
+                <a:ea typeface="Lohit Tamil Classical"/>
+                <a:cs typeface="Lohit Tamil Classical"/>
+              </a:rPr>
+              <a:t> </a:t>
+            </a:r>
+            <a:r>
+              <a:rPr lang="ru-RU" sz="2200" b="0" i="0" u="none" strike="noStrike" cap="none" spc="0">
+                <a:solidFill>
+                  <a:schemeClr val="tx1"/>
+                </a:solidFill>
+                <a:latin typeface="Lohit Tamil Classical"/>
+                <a:ea typeface="Lohit Tamil Classical"/>
+                <a:cs typeface="Lohit Tamil Classical"/>
+              </a:rPr>
+              <a:t>выходных параметров в зависимости от </a:t>
+            </a:r>
+            <a:r>
+              <a:rPr lang="ru-RU" sz="2200" b="0" i="0" u="none" strike="noStrike" cap="none" spc="0">
+                <a:solidFill>
+                  <a:schemeClr val="tx1"/>
                 </a:solidFill>
                 <a:latin typeface="Lohit Tamil Classical"/>
                 <a:ea typeface="Lohit Tamil Classical"/>
@@ -4448,7 +4973,7 @@
             <a:r>
               <a:rPr lang="ru-RU" sz="2200" b="0" i="0" u="none" strike="noStrike" cap="none" spc="0">
                 <a:solidFill>
-                  <a:srgbClr val="000000"/>
+                  <a:schemeClr val="tx1"/>
                 </a:solidFill>
                 <a:latin typeface="Lohit Tamil Classical"/>
                 <a:ea typeface="Lohit Tamil Classical"/>
@@ -4459,15 +4984,62 @@
             <a:r>
               <a:rPr lang="ru-RU" sz="2200" b="0" i="0" u="none" strike="noStrike" cap="none" spc="0">
                 <a:solidFill>
-                  <a:srgbClr val="000000"/>
-                </a:solidFill>
-                <a:latin typeface="Lohit Tamil Classical"/>
-                <a:ea typeface="Lohit Tamil Classical"/>
-                <a:cs typeface="Lohit Tamil Classical"/>
-              </a:rPr>
-              <a:t> (графики см. в дашборде)</a:t>
+                  <a:schemeClr val="tx1"/>
+                </a:solidFill>
+                <a:latin typeface="Lohit Tamil Classical"/>
+                <a:ea typeface="Lohit Tamil Classical"/>
+                <a:cs typeface="Lohit Tamil Classical"/>
+              </a:rPr>
+              <a:t> (все графики см.</a:t>
+            </a:r>
+            <a:r>
+              <a:rPr lang="ru-RU" sz="2200" b="0" i="0" u="none" strike="noStrike" cap="none" spc="0">
+                <a:solidFill>
+                  <a:schemeClr val="tx1"/>
+                </a:solidFill>
+                <a:latin typeface="Lohit Tamil Classical"/>
+                <a:ea typeface="Lohit Tamil Classical"/>
+                <a:cs typeface="Lohit Tamil Classical"/>
+              </a:rPr>
+              <a:t> </a:t>
+            </a:r>
+            <a:r>
+              <a:rPr lang="ru-RU" sz="2200" b="0" i="0" u="none" strike="noStrike" cap="none" spc="0">
+                <a:solidFill>
+                  <a:schemeClr val="tx1"/>
+                </a:solidFill>
+                <a:latin typeface="Lohit Tamil Classical"/>
+                <a:ea typeface="Lohit Tamil Classical"/>
+                <a:cs typeface="Lohit Tamil Classical"/>
+              </a:rPr>
+              <a:t>в</a:t>
+            </a:r>
+            <a:r>
+              <a:rPr lang="ru-RU" sz="2200" b="0" i="0" u="none" strike="noStrike" cap="none" spc="0">
+                <a:solidFill>
+                  <a:schemeClr val="tx1"/>
+                </a:solidFill>
+                <a:latin typeface="Lohit Tamil Classical"/>
+                <a:ea typeface="Lohit Tamil Classical"/>
+                <a:cs typeface="Lohit Tamil Classical"/>
+              </a:rPr>
+              <a:t> </a:t>
+            </a:r>
+            <a:r>
+              <a:rPr lang="ru-RU" sz="2200" b="0" i="0" u="none" strike="noStrike" cap="none" spc="0">
+                <a:solidFill>
+                  <a:schemeClr val="tx1"/>
+                </a:solidFill>
+                <a:latin typeface="Lohit Tamil Classical"/>
+                <a:ea typeface="Lohit Tamil Classical"/>
+                <a:cs typeface="Lohit Tamil Classical"/>
+              </a:rPr>
+              <a:t>дашборде)</a:t>
             </a:r>
             <a:endParaRPr sz="2200">
+              <a:solidFill>
+                <a:schemeClr val="tx1"/>
+              </a:solidFill>
               <a:latin typeface="Lohit Tamil Classical"/>
               <a:cs typeface="Lohit Tamil Classical"/>
             </a:endParaRPr>
@@ -4484,7 +5056,7 @@
             <a:r>
               <a:rPr lang="ru-RU" sz="2200" b="0" i="0" u="none" strike="noStrike" cap="none" spc="0">
                 <a:solidFill>
-                  <a:srgbClr val="000000"/>
+                  <a:schemeClr val="tx1"/>
                 </a:solidFill>
                 <a:latin typeface="Lohit Tamil Classical"/>
                 <a:ea typeface="Lohit Tamil Classical"/>
@@ -4495,15 +5067,84 @@
             <a:r>
               <a:rPr lang="ru-RU" sz="2200" b="0" i="0" u="none" strike="noStrike" cap="none" spc="0">
                 <a:solidFill>
-                  <a:srgbClr val="000000"/>
-                </a:solidFill>
-                <a:latin typeface="Lohit Tamil Classical"/>
-                <a:ea typeface="Lohit Tamil Classical"/>
-                <a:cs typeface="Lohit Tamil Classical"/>
-              </a:rPr>
-              <a:t> и отдельно выделили факторы, влияющие на процент сухого остатка и массу готового продукта</a:t>
+                  <a:schemeClr val="tx1"/>
+                </a:solidFill>
+                <a:latin typeface="Lohit Tamil Classical"/>
+                <a:ea typeface="Lohit Tamil Classical"/>
+                <a:cs typeface="Lohit Tamil Classical"/>
+              </a:rPr>
+              <a:t> и</a:t>
+            </a:r>
+            <a:r>
+              <a:rPr lang="ru-RU" sz="2200" b="0" i="0" u="none" strike="noStrike" cap="none" spc="0">
+                <a:solidFill>
+                  <a:schemeClr val="tx1"/>
+                </a:solidFill>
+                <a:latin typeface="Lohit Tamil Classical"/>
+                <a:ea typeface="Lohit Tamil Classical"/>
+                <a:cs typeface="Lohit Tamil Classical"/>
+              </a:rPr>
+              <a:t> </a:t>
+            </a:r>
+            <a:r>
+              <a:rPr lang="ru-RU" sz="2200" b="0" i="0" u="none" strike="noStrike" cap="none" spc="0">
+                <a:solidFill>
+                  <a:schemeClr val="tx1"/>
+                </a:solidFill>
+                <a:latin typeface="Lohit Tamil Classical"/>
+                <a:ea typeface="Lohit Tamil Classical"/>
+                <a:cs typeface="Lohit Tamil Classical"/>
+              </a:rPr>
+              <a:t>отдельно выделили факторы, влияющие на</a:t>
+            </a:r>
+            <a:r>
+              <a:rPr lang="ru-RU" sz="2200" b="0" i="0" u="none" strike="noStrike" cap="none" spc="0">
+                <a:solidFill>
+                  <a:schemeClr val="tx1"/>
+                </a:solidFill>
+                <a:latin typeface="Lohit Tamil Classical"/>
+                <a:ea typeface="Lohit Tamil Classical"/>
+                <a:cs typeface="Lohit Tamil Classical"/>
+              </a:rPr>
+              <a:t> </a:t>
+            </a:r>
+            <a:r>
+              <a:rPr lang="ru-RU" sz="2200" b="0" i="0" u="none" strike="noStrike" cap="none" spc="0">
+                <a:solidFill>
+                  <a:schemeClr val="tx1"/>
+                </a:solidFill>
+                <a:latin typeface="Lohit Tamil Classical"/>
+                <a:ea typeface="Lohit Tamil Classical"/>
+                <a:cs typeface="Lohit Tamil Classical"/>
+              </a:rPr>
+              <a:t>процент сухого остатка и</a:t>
+            </a:r>
+            <a:r>
+              <a:rPr lang="ru-RU" sz="2200" b="0" i="0" u="none" strike="noStrike" cap="none" spc="0">
+                <a:solidFill>
+                  <a:schemeClr val="tx1"/>
+                </a:solidFill>
+                <a:latin typeface="Lohit Tamil Classical"/>
+                <a:ea typeface="Lohit Tamil Classical"/>
+                <a:cs typeface="Lohit Tamil Classical"/>
+              </a:rPr>
+              <a:t> </a:t>
+            </a:r>
+            <a:r>
+              <a:rPr lang="ru-RU" sz="2200" b="0" i="0" u="none" strike="noStrike" cap="none" spc="0">
+                <a:solidFill>
+                  <a:schemeClr val="tx1"/>
+                </a:solidFill>
+                <a:latin typeface="Lohit Tamil Classical"/>
+                <a:ea typeface="Lohit Tamil Classical"/>
+                <a:cs typeface="Lohit Tamil Classical"/>
+              </a:rPr>
+              <a:t>массу готового продукта</a:t>
             </a:r>
             <a:endParaRPr sz="2200">
+              <a:solidFill>
+                <a:schemeClr val="tx1"/>
+              </a:solidFill>
               <a:latin typeface="Lohit Tamil Classical"/>
               <a:cs typeface="Lohit Tamil Classical"/>
             </a:endParaRPr>
@@ -4575,7 +5216,7 @@
         </p:nvSpPr>
         <p:spPr bwMode="auto">
           <a:xfrm flipH="0" flipV="0">
-            <a:off x="905848" y="838198"/>
+            <a:off x="905847" y="838197"/>
             <a:ext cx="5585450" cy="823319"/>
           </a:xfrm>
           <a:prstGeom prst="rect">
@@ -4593,6 +5234,9 @@
             </a:pPr>
             <a:r>
               <a:rPr sz="4800">
+                <a:solidFill>
+                  <a:schemeClr val="tx1"/>
+                </a:solidFill>
                 <a:latin typeface="Lohit Tamil Classical"/>
                 <a:ea typeface="Lohit Tamil Classical"/>
                 <a:cs typeface="Lohit Tamil Classical"/>
@@ -4600,6 +5244,9 @@
               <a:t>Проверка гипотез</a:t>
             </a:r>
             <a:endParaRPr sz="4800">
+              <a:solidFill>
+                <a:schemeClr val="tx1"/>
+              </a:solidFill>
               <a:latin typeface="Lohit Tamil Classical"/>
               <a:ea typeface="Lohit Tamil Classical"/>
               <a:cs typeface="Lohit Tamil Classical"/>
@@ -4615,8 +5262,8 @@
         </p:nvSpPr>
         <p:spPr bwMode="auto">
           <a:xfrm flipH="0" flipV="0">
-            <a:off x="905847" y="2158183"/>
-            <a:ext cx="9615764" cy="2405211"/>
+            <a:off x="905845" y="2158182"/>
+            <a:ext cx="9621162" cy="2405211"/>
           </a:xfrm>
           <a:prstGeom prst="rect">
             <a:avLst/>
@@ -4639,7 +5286,7 @@
             <a:r>
               <a:rPr sz="2200" b="0" i="0" u="none">
                 <a:solidFill>
-                  <a:srgbClr val="1F1F1F"/>
+                  <a:schemeClr val="tx1"/>
                 </a:solidFill>
                 <a:latin typeface="Lohit Tamil Classical"/>
                 <a:ea typeface="Lohit Tamil Classical"/>
@@ -4648,6 +5295,9 @@
               <a:t>Есть ли различия в доле опасного газа от смены?</a:t>
             </a:r>
             <a:endParaRPr sz="2200">
+              <a:solidFill>
+                <a:schemeClr val="tx1"/>
+              </a:solidFill>
               <a:latin typeface="Lohit Tamil Classical"/>
               <a:cs typeface="Lohit Tamil Classical"/>
             </a:endParaRPr>
@@ -4664,7 +5314,7 @@
             <a:r>
               <a:rPr sz="2200" b="0" i="0" u="none">
                 <a:solidFill>
-                  <a:srgbClr val="1F1F1F"/>
+                  <a:schemeClr val="tx1"/>
                 </a:solidFill>
                 <a:latin typeface="Lohit Tamil Classical"/>
                 <a:ea typeface="Lohit Tamil Classical"/>
@@ -4675,17 +5325,61 @@
             <a:r>
               <a:rPr sz="2200" b="0" i="0" u="none">
                 <a:solidFill>
-                  <a:srgbClr val="1F1F1F"/>
-                </a:solidFill>
-                <a:latin typeface="Lohit Tamil Classical"/>
-                <a:ea typeface="Lohit Tamil Classical"/>
-                <a:cs typeface="Lohit Tamil Classical"/>
-              </a:rPr>
-              <a:t>на этапе 3? Считать, что высокая температура хуже</a:t>
+                  <a:schemeClr val="tx1"/>
+                </a:solidFill>
+                <a:latin typeface="Lohit Tamil Classical"/>
+                <a:ea typeface="Lohit Tamil Classical"/>
+                <a:cs typeface="Lohit Tamil Classical"/>
+              </a:rPr>
+              <a:t>на</a:t>
+            </a:r>
+            <a:r>
+              <a:rPr lang="ru-RU" sz="2200" b="0" i="0" u="none" strike="noStrike" cap="none" spc="0">
+                <a:solidFill>
+                  <a:schemeClr val="tx1"/>
+                </a:solidFill>
+                <a:latin typeface="Lohit Tamil Classical"/>
+                <a:ea typeface="Lohit Tamil Classical"/>
+                <a:cs typeface="Lohit Tamil Classical"/>
+              </a:rPr>
+              <a:t> </a:t>
+            </a:r>
+            <a:r>
+              <a:rPr sz="2200" b="0" i="0" u="none">
+                <a:solidFill>
+                  <a:schemeClr val="tx1"/>
+                </a:solidFill>
+                <a:latin typeface="Lohit Tamil Classical"/>
+                <a:ea typeface="Lohit Tamil Classical"/>
+                <a:cs typeface="Lohit Tamil Classical"/>
+              </a:rPr>
+              <a:t>этапе</a:t>
+            </a:r>
+            <a:r>
+              <a:rPr lang="ru-RU" sz="2200" b="0" i="0" u="none" strike="noStrike" cap="none" spc="0">
+                <a:solidFill>
+                  <a:schemeClr val="tx1"/>
+                </a:solidFill>
+                <a:latin typeface="Lohit Tamil Classical"/>
+                <a:ea typeface="Lohit Tamil Classical"/>
+                <a:cs typeface="Lohit Tamil Classical"/>
+              </a:rPr>
+              <a:t> </a:t>
+            </a:r>
+            <a:r>
+              <a:rPr sz="2200" b="0" i="0" u="none">
+                <a:solidFill>
+                  <a:schemeClr val="tx1"/>
+                </a:solidFill>
+                <a:latin typeface="Lohit Tamil Classical"/>
+                <a:ea typeface="Lohit Tamil Classical"/>
+                <a:cs typeface="Lohit Tamil Classical"/>
+              </a:rPr>
+              <a:t>3? Считать, что высокая температура хуже</a:t>
             </a:r>
             <a:endParaRPr sz="2200" b="0" i="0" u="none">
               <a:solidFill>
-                <a:srgbClr val="1F1F1F"/>
+                <a:schemeClr val="tx1"/>
               </a:solidFill>
               <a:latin typeface="Lohit Tamil Classical"/>
               <a:ea typeface="Lohit Tamil Classical"/>
@@ -4704,15 +5398,84 @@
             <a:r>
               <a:rPr sz="2200" b="0" i="0" u="none">
                 <a:solidFill>
-                  <a:srgbClr val="1F1F1F"/>
-                </a:solidFill>
-                <a:latin typeface="Lohit Tamil Classical"/>
-                <a:ea typeface="Lohit Tamil Classical"/>
-                <a:cs typeface="Lohit Tamil Classical"/>
-              </a:rPr>
-              <a:t>Конверсия мономера на 1 этапе влияет на количество подаваемой суммарной воды</a:t>
+                  <a:schemeClr val="tx1"/>
+                </a:solidFill>
+                <a:latin typeface="Lohit Tamil Classical"/>
+                <a:ea typeface="Lohit Tamil Classical"/>
+                <a:cs typeface="Lohit Tamil Classical"/>
+              </a:rPr>
+              <a:t>Конверсия мономера на</a:t>
+            </a:r>
+            <a:r>
+              <a:rPr lang="ru-RU" sz="2200" b="0" i="0" u="none" strike="noStrike" cap="none" spc="0">
+                <a:solidFill>
+                  <a:schemeClr val="tx1"/>
+                </a:solidFill>
+                <a:latin typeface="Lohit Tamil Classical"/>
+                <a:ea typeface="Lohit Tamil Classical"/>
+                <a:cs typeface="Lohit Tamil Classical"/>
+              </a:rPr>
+              <a:t> </a:t>
+            </a:r>
+            <a:r>
+              <a:rPr sz="2200" b="0" i="0" u="none">
+                <a:solidFill>
+                  <a:schemeClr val="tx1"/>
+                </a:solidFill>
+                <a:latin typeface="Lohit Tamil Classical"/>
+                <a:ea typeface="Lohit Tamil Classical"/>
+                <a:cs typeface="Lohit Tamil Classical"/>
+              </a:rPr>
+              <a:t>1</a:t>
+            </a:r>
+            <a:r>
+              <a:rPr lang="ru-RU" sz="2200" b="0" i="0" u="none" strike="noStrike" cap="none" spc="0">
+                <a:solidFill>
+                  <a:schemeClr val="tx1"/>
+                </a:solidFill>
+                <a:latin typeface="Lohit Tamil Classical"/>
+                <a:ea typeface="Lohit Tamil Classical"/>
+                <a:cs typeface="Lohit Tamil Classical"/>
+              </a:rPr>
+              <a:t> </a:t>
+            </a:r>
+            <a:r>
+              <a:rPr sz="2200" b="0" i="0" u="none">
+                <a:solidFill>
+                  <a:schemeClr val="tx1"/>
+                </a:solidFill>
+                <a:latin typeface="Lohit Tamil Classical"/>
+                <a:ea typeface="Lohit Tamil Classical"/>
+                <a:cs typeface="Lohit Tamil Classical"/>
+              </a:rPr>
+              <a:t>этапе влияет на</a:t>
+            </a:r>
+            <a:r>
+              <a:rPr lang="ru-RU" sz="2200" b="0" i="0" u="none" strike="noStrike" cap="none" spc="0">
+                <a:solidFill>
+                  <a:schemeClr val="tx1"/>
+                </a:solidFill>
+                <a:latin typeface="Lohit Tamil Classical"/>
+                <a:ea typeface="Lohit Tamil Classical"/>
+                <a:cs typeface="Lohit Tamil Classical"/>
+              </a:rPr>
+              <a:t> </a:t>
+            </a:r>
+            <a:r>
+              <a:rPr sz="2200" b="0" i="0" u="none">
+                <a:solidFill>
+                  <a:schemeClr val="tx1"/>
+                </a:solidFill>
+                <a:latin typeface="Lohit Tamil Classical"/>
+                <a:ea typeface="Lohit Tamil Classical"/>
+                <a:cs typeface="Lohit Tamil Classical"/>
+              </a:rPr>
+              <a:t>количество подаваемой суммарной воды</a:t>
             </a:r>
             <a:endParaRPr sz="2200">
+              <a:solidFill>
+                <a:schemeClr val="tx1"/>
+              </a:solidFill>
               <a:latin typeface="Lohit Tamil Classical"/>
               <a:cs typeface="Lohit Tamil Classical"/>
             </a:endParaRPr>
@@ -4729,7 +5492,7 @@
             <a:r>
               <a:rPr sz="2200" b="0" i="0" u="none">
                 <a:solidFill>
-                  <a:srgbClr val="1F1F1F"/>
+                  <a:schemeClr val="tx1"/>
                 </a:solidFill>
                 <a:latin typeface="Lohit Tamil Classical"/>
                 <a:ea typeface="Lohit Tamil Classical"/>
@@ -4740,17 +5503,61 @@
             <a:r>
               <a:rPr sz="2200" b="0" i="0" u="none">
                 <a:solidFill>
-                  <a:srgbClr val="1F1F1F"/>
-                </a:solidFill>
-                <a:latin typeface="Lohit Tamil Classical"/>
-                <a:ea typeface="Lohit Tamil Classical"/>
-                <a:cs typeface="Lohit Tamil Classical"/>
-              </a:rPr>
-              <a:t>одного продукта связано с долей опасного газа</a:t>
+                  <a:schemeClr val="tx1"/>
+                </a:solidFill>
+                <a:latin typeface="Lohit Tamil Classical"/>
+                <a:ea typeface="Lohit Tamil Classical"/>
+                <a:cs typeface="Lohit Tamil Classical"/>
+              </a:rPr>
+              <a:t>одного продукта связано с</a:t>
+            </a:r>
+            <a:r>
+              <a:rPr lang="ru-RU" sz="2200" b="0" i="0" u="none" strike="noStrike" cap="none" spc="0">
+                <a:solidFill>
+                  <a:schemeClr val="tx1"/>
+                </a:solidFill>
+                <a:latin typeface="Lohit Tamil Classical"/>
+                <a:ea typeface="Lohit Tamil Classical"/>
+                <a:cs typeface="Lohit Tamil Classical"/>
+              </a:rPr>
+              <a:t> </a:t>
+            </a:r>
+            <a:r>
+              <a:rPr sz="2200" b="0" i="0" u="none">
+                <a:solidFill>
+                  <a:schemeClr val="tx1"/>
+                </a:solidFill>
+                <a:latin typeface="Lohit Tamil Classical"/>
+                <a:ea typeface="Lohit Tamil Classical"/>
+                <a:cs typeface="Lohit Tamil Classical"/>
+              </a:rPr>
+              <a:t>долей опасного</a:t>
+            </a:r>
+            <a:r>
+              <a:rPr lang="ru-RU" sz="2200" b="0" i="0" u="none" strike="noStrike" cap="none" spc="0">
+                <a:solidFill>
+                  <a:schemeClr val="tx1"/>
+                </a:solidFill>
+                <a:latin typeface="Lohit Tamil Classical"/>
+                <a:ea typeface="Lohit Tamil Classical"/>
+                <a:cs typeface="Lohit Tamil Classical"/>
+              </a:rPr>
+              <a:t> </a:t>
+            </a:r>
+            <a:r>
+              <a:rPr sz="2200" b="0" i="0" u="none">
+                <a:solidFill>
+                  <a:schemeClr val="tx1"/>
+                </a:solidFill>
+                <a:latin typeface="Lohit Tamil Classical"/>
+                <a:ea typeface="Lohit Tamil Classical"/>
+                <a:cs typeface="Lohit Tamil Classical"/>
+              </a:rPr>
+              <a:t>газа</a:t>
             </a:r>
             <a:endParaRPr sz="2200" b="0" i="0" u="none">
               <a:solidFill>
-                <a:srgbClr val="1F1F1F"/>
+                <a:schemeClr val="tx1"/>
               </a:solidFill>
               <a:latin typeface="Lohit Tamil Classical"/>
               <a:cs typeface="Lohit Tamil Classical"/>
@@ -4817,8 +5624,8 @@
         </p:nvSpPr>
         <p:spPr bwMode="auto">
           <a:xfrm flipH="0" flipV="0">
-            <a:off x="905847" y="838197"/>
-            <a:ext cx="5585449" cy="823318"/>
+            <a:off x="905846" y="838197"/>
+            <a:ext cx="5585450" cy="823319"/>
           </a:xfrm>
           <a:prstGeom prst="rect">
             <a:avLst/>
@@ -4835,6 +5642,9 @@
             </a:pPr>
             <a:r>
               <a:rPr sz="4800">
+                <a:solidFill>
+                  <a:schemeClr val="tx1"/>
+                </a:solidFill>
                 <a:latin typeface="Lohit Tamil Classical"/>
                 <a:ea typeface="Lohit Tamil Classical"/>
                 <a:cs typeface="Lohit Tamil Classical"/>
@@ -4842,6 +5652,9 @@
               <a:t>Проверка гипотез</a:t>
             </a:r>
             <a:endParaRPr sz="4800">
+              <a:solidFill>
+                <a:schemeClr val="tx1"/>
+              </a:solidFill>
               <a:latin typeface="Lohit Tamil Classical"/>
               <a:ea typeface="Lohit Tamil Classical"/>
               <a:cs typeface="Lohit Tamil Classical"/>
@@ -4857,8 +5670,8 @@
         </p:nvSpPr>
         <p:spPr bwMode="auto">
           <a:xfrm flipH="0" flipV="0">
-            <a:off x="905847" y="2158183"/>
-            <a:ext cx="9626204" cy="2790780"/>
+            <a:off x="905845" y="2158182"/>
+            <a:ext cx="9638082" cy="2790780"/>
           </a:xfrm>
           <a:prstGeom prst="rect">
             <a:avLst/>
@@ -4887,18 +5700,62 @@
             <a:r>
               <a:rPr sz="2200" b="0" i="0" u="none">
                 <a:solidFill>
-                  <a:srgbClr val="1F1F1F"/>
-                </a:solidFill>
-                <a:latin typeface="Lohit Tamil Classical"/>
-                <a:ea typeface="Lohit Tamil Classical"/>
-                <a:cs typeface="Lohit Tamil Classical"/>
-              </a:rPr>
-              <a:t>Большое кол-во подаваемого пара на 3 стадии влечёт </a:t>
+                  <a:schemeClr val="tx1"/>
+                </a:solidFill>
+                <a:latin typeface="Lohit Tamil Classical"/>
+                <a:ea typeface="Lohit Tamil Classical"/>
+                <a:cs typeface="Lohit Tamil Classical"/>
+              </a:rPr>
+              <a:t>Большое кол-во подаваемого пара на</a:t>
+            </a:r>
+            <a:r>
+              <a:rPr lang="ru-RU" sz="2200" b="0" i="0" u="none" strike="noStrike" cap="none" spc="0">
+                <a:solidFill>
+                  <a:schemeClr val="tx1"/>
+                </a:solidFill>
+                <a:latin typeface="Lohit Tamil Classical"/>
+                <a:ea typeface="Lohit Tamil Classical"/>
+                <a:cs typeface="Lohit Tamil Classical"/>
+              </a:rPr>
+              <a:t> </a:t>
             </a:r>
             <a:r>
               <a:rPr sz="2200" b="0" i="0" u="none">
                 <a:solidFill>
-                  <a:srgbClr val="1F1F1F"/>
+                  <a:schemeClr val="tx1"/>
+                </a:solidFill>
+                <a:latin typeface="Lohit Tamil Classical"/>
+                <a:ea typeface="Lohit Tamil Classical"/>
+                <a:cs typeface="Lohit Tamil Classical"/>
+              </a:rPr>
+              <a:t>3</a:t>
+            </a:r>
+            <a:r>
+              <a:rPr lang="ru-RU" sz="2200" b="0" i="0" u="none" strike="noStrike" cap="none" spc="0">
+                <a:solidFill>
+                  <a:schemeClr val="tx1"/>
+                </a:solidFill>
+                <a:latin typeface="Lohit Tamil Classical"/>
+                <a:ea typeface="Lohit Tamil Classical"/>
+                <a:cs typeface="Lohit Tamil Classical"/>
+              </a:rPr>
+              <a:t> </a:t>
+            </a:r>
+            <a:r>
+              <a:rPr sz="2200" b="0" i="0" u="none">
+                <a:solidFill>
+                  <a:schemeClr val="tx1"/>
+                </a:solidFill>
+                <a:latin typeface="Lohit Tamil Classical"/>
+                <a:ea typeface="Lohit Tamil Classical"/>
+                <a:cs typeface="Lohit Tamil Classical"/>
+              </a:rPr>
+              <a:t>стадии влечёт </a:t>
+            </a:r>
+            <a:r>
+              <a:rPr sz="2200" b="0" i="0" u="none">
+                <a:solidFill>
+                  <a:schemeClr val="tx1"/>
                 </a:solidFill>
                 <a:latin typeface="Lohit Tamil Classical"/>
                 <a:ea typeface="Lohit Tamil Classical"/>
@@ -4909,7 +5766,7 @@
             <a:r>
               <a:rPr sz="2200" b="0" i="0" u="none">
                 <a:solidFill>
-                  <a:srgbClr val="333333"/>
+                  <a:schemeClr val="tx1"/>
                 </a:solidFill>
                 <a:latin typeface="Lohit Tamil Classical"/>
                 <a:ea typeface="Lohit Tamil Classical"/>
@@ -4920,7 +5777,7 @@
             <a:r>
               <a:rPr sz="2200" b="0" i="0" u="none">
                 <a:solidFill>
-                  <a:srgbClr val="1F1F1F"/>
+                  <a:schemeClr val="tx1"/>
                 </a:solidFill>
                 <a:latin typeface="Lohit Tamil Classical"/>
                 <a:ea typeface="Lohit Tamil Classical"/>
@@ -4931,7 +5788,7 @@
             <a:r>
               <a:rPr sz="2200" b="0" i="0" u="none">
                 <a:solidFill>
-                  <a:srgbClr val="1F1F1F"/>
+                  <a:schemeClr val="tx1"/>
                 </a:solidFill>
                 <a:latin typeface="Lohit Tamil Classical"/>
                 <a:ea typeface="Lohit Tamil Classical"/>
@@ -4941,7 +5798,7 @@
             </a:r>
             <a:endParaRPr sz="2200" b="0" i="0" u="none">
               <a:solidFill>
-                <a:srgbClr val="1F1F1F"/>
+                <a:schemeClr val="tx1"/>
               </a:solidFill>
               <a:latin typeface="Lohit Tamil Classical"/>
               <a:cs typeface="Lohit Tamil Classical"/>
@@ -4965,15 +5822,150 @@
             <a:r>
               <a:rPr sz="2200" b="0" i="0" u="none">
                 <a:solidFill>
-                  <a:srgbClr val="1F1F1F"/>
-                </a:solidFill>
-                <a:latin typeface="Lohit Tamil Classical"/>
-                <a:ea typeface="Lohit Tamil Classical"/>
-                <a:cs typeface="Lohit Tamil Classical"/>
-              </a:rPr>
-              <a:t>Большой процент сухого остатка и большая масса готового продукта возможны ТОЛЬКО при достаточно высокой температуре верха в агрегате на 3 стадии</a:t>
+                  <a:schemeClr val="tx1"/>
+                </a:solidFill>
+                <a:latin typeface="Lohit Tamil Classical"/>
+                <a:ea typeface="Lohit Tamil Classical"/>
+                <a:cs typeface="Lohit Tamil Classical"/>
+              </a:rPr>
+              <a:t>Большой процент сухого остатка и</a:t>
+            </a:r>
+            <a:r>
+              <a:rPr lang="ru-RU" sz="2200" b="0" i="0" u="none" strike="noStrike" cap="none" spc="0">
+                <a:solidFill>
+                  <a:schemeClr val="tx1"/>
+                </a:solidFill>
+                <a:latin typeface="Lohit Tamil Classical"/>
+                <a:ea typeface="Lohit Tamil Classical"/>
+                <a:cs typeface="Lohit Tamil Classical"/>
+              </a:rPr>
+              <a:t> </a:t>
+            </a:r>
+            <a:r>
+              <a:rPr sz="2200" b="0" i="0" u="none">
+                <a:solidFill>
+                  <a:schemeClr val="tx1"/>
+                </a:solidFill>
+                <a:latin typeface="Lohit Tamil Classical"/>
+                <a:ea typeface="Lohit Tamil Classical"/>
+                <a:cs typeface="Lohit Tamil Classical"/>
+              </a:rPr>
+              <a:t>большая масса готового продукта возможны </a:t>
+            </a:r>
+            <a:r>
+              <a:rPr sz="2200" b="0" i="0" u="sng">
+                <a:solidFill>
+                  <a:schemeClr val="tx1"/>
+                </a:solidFill>
+                <a:latin typeface="Lohit Tamil Classical"/>
+                <a:ea typeface="Lohit Tamil Classical"/>
+                <a:cs typeface="Lohit Tamil Classical"/>
+              </a:rPr>
+              <a:t>только</a:t>
+            </a:r>
+            <a:r>
+              <a:rPr sz="2200" b="0" i="0" u="none">
+                <a:solidFill>
+                  <a:schemeClr val="tx1"/>
+                </a:solidFill>
+                <a:latin typeface="Lohit Tamil Classical"/>
+                <a:ea typeface="Lohit Tamil Classical"/>
+                <a:cs typeface="Lohit Tamil Classical"/>
+              </a:rPr>
+              <a:t> при</a:t>
+            </a:r>
+            <a:r>
+              <a:rPr lang="ru-RU" sz="2200" b="0" i="0" u="none" strike="noStrike" cap="none" spc="0">
+                <a:solidFill>
+                  <a:schemeClr val="tx1"/>
+                </a:solidFill>
+                <a:latin typeface="Lohit Tamil Classical"/>
+                <a:ea typeface="Lohit Tamil Classical"/>
+                <a:cs typeface="Lohit Tamil Classical"/>
+              </a:rPr>
+              <a:t> </a:t>
+            </a:r>
+            <a:r>
+              <a:rPr sz="2200" b="0" i="0" u="none">
+                <a:solidFill>
+                  <a:schemeClr val="tx1"/>
+                </a:solidFill>
+                <a:latin typeface="Lohit Tamil Classical"/>
+                <a:ea typeface="Lohit Tamil Classical"/>
+                <a:cs typeface="Lohit Tamil Classical"/>
+              </a:rPr>
+              <a:t>достаточно высокой температуре верха в</a:t>
+            </a:r>
+            <a:r>
+              <a:rPr lang="ru-RU" sz="2200" b="0" i="0" u="none" strike="noStrike" cap="none" spc="0">
+                <a:solidFill>
+                  <a:schemeClr val="tx1"/>
+                </a:solidFill>
+                <a:latin typeface="Lohit Tamil Classical"/>
+                <a:ea typeface="Lohit Tamil Classical"/>
+                <a:cs typeface="Lohit Tamil Classical"/>
+              </a:rPr>
+              <a:t> </a:t>
+            </a:r>
+            <a:r>
+              <a:rPr sz="2200" b="0" i="0" u="none">
+                <a:solidFill>
+                  <a:schemeClr val="tx1"/>
+                </a:solidFill>
+                <a:latin typeface="Lohit Tamil Classical"/>
+                <a:ea typeface="Lohit Tamil Classical"/>
+                <a:cs typeface="Lohit Tamil Classical"/>
+              </a:rPr>
+              <a:t>агрегате на</a:t>
+            </a:r>
+            <a:r>
+              <a:rPr lang="ru-RU" sz="2200" b="0" i="0" u="none" strike="noStrike" cap="none" spc="0">
+                <a:solidFill>
+                  <a:schemeClr val="tx1"/>
+                </a:solidFill>
+                <a:latin typeface="Lohit Tamil Classical"/>
+                <a:ea typeface="Lohit Tamil Classical"/>
+                <a:cs typeface="Lohit Tamil Classical"/>
+              </a:rPr>
+              <a:t> </a:t>
+            </a:r>
+            <a:r>
+              <a:rPr sz="2200" b="0" i="0" u="none">
+                <a:solidFill>
+                  <a:schemeClr val="tx1"/>
+                </a:solidFill>
+                <a:latin typeface="Lohit Tamil Classical"/>
+                <a:ea typeface="Lohit Tamil Classical"/>
+                <a:cs typeface="Lohit Tamil Classical"/>
+              </a:rPr>
+              <a:t>3</a:t>
+            </a:r>
+            <a:r>
+              <a:rPr lang="ru-RU" sz="2200" b="0" i="0" u="none" strike="noStrike" cap="none" spc="0">
+                <a:solidFill>
+                  <a:schemeClr val="tx1"/>
+                </a:solidFill>
+                <a:latin typeface="Lohit Tamil Classical"/>
+                <a:ea typeface="Lohit Tamil Classical"/>
+                <a:cs typeface="Lohit Tamil Classical"/>
+              </a:rPr>
+              <a:t> </a:t>
+            </a:r>
+            <a:r>
+              <a:rPr sz="2200" b="0" i="0" u="none">
+                <a:solidFill>
+                  <a:schemeClr val="tx1"/>
+                </a:solidFill>
+                <a:latin typeface="Lohit Tamil Classical"/>
+                <a:ea typeface="Lohit Tamil Classical"/>
+                <a:cs typeface="Lohit Tamil Classical"/>
+              </a:rPr>
+              <a:t>стадии</a:t>
             </a:r>
             <a:endParaRPr sz="2200">
+              <a:solidFill>
+                <a:schemeClr val="tx1"/>
+              </a:solidFill>
               <a:latin typeface="Lohit Tamil Classical"/>
               <a:cs typeface="Lohit Tamil Classical"/>
             </a:endParaRPr>
@@ -4996,15 +5988,95 @@
             <a:r>
               <a:rPr sz="2200" b="0" i="0" u="none">
                 <a:solidFill>
-                  <a:srgbClr val="1F1F1F"/>
-                </a:solidFill>
-                <a:latin typeface="Lohit Tamil Classical"/>
-                <a:ea typeface="Lohit Tamil Classical"/>
-                <a:cs typeface="Lohit Tamil Classical"/>
-              </a:rPr>
-              <a:t>Большое кол-во вакуума на 2 стадии НЕ даёт большой процент сухого остатка</a:t>
+                  <a:schemeClr val="tx1"/>
+                </a:solidFill>
+                <a:latin typeface="Lohit Tamil Classical"/>
+                <a:ea typeface="Lohit Tamil Classical"/>
+                <a:cs typeface="Lohit Tamil Classical"/>
+              </a:rPr>
+              <a:t>Большое кол-во вакуума на</a:t>
+            </a:r>
+            <a:r>
+              <a:rPr lang="ru-RU" sz="2200" b="0" i="0" u="none" strike="noStrike" cap="none" spc="0">
+                <a:solidFill>
+                  <a:schemeClr val="tx1"/>
+                </a:solidFill>
+                <a:latin typeface="Lohit Tamil Classical"/>
+                <a:ea typeface="Lohit Tamil Classical"/>
+                <a:cs typeface="Lohit Tamil Classical"/>
+              </a:rPr>
+              <a:t> </a:t>
+            </a:r>
+            <a:r>
+              <a:rPr sz="2200" b="0" i="0" u="none">
+                <a:solidFill>
+                  <a:schemeClr val="tx1"/>
+                </a:solidFill>
+                <a:latin typeface="Lohit Tamil Classical"/>
+                <a:ea typeface="Lohit Tamil Classical"/>
+                <a:cs typeface="Lohit Tamil Classical"/>
+              </a:rPr>
+              <a:t>2</a:t>
+            </a:r>
+            <a:r>
+              <a:rPr lang="ru-RU" sz="2200" b="0" i="0" u="none" strike="noStrike" cap="none" spc="0">
+                <a:solidFill>
+                  <a:schemeClr val="tx1"/>
+                </a:solidFill>
+                <a:latin typeface="Lohit Tamil Classical"/>
+                <a:ea typeface="Lohit Tamil Classical"/>
+                <a:cs typeface="Lohit Tamil Classical"/>
+              </a:rPr>
+              <a:t> </a:t>
+            </a:r>
+            <a:r>
+              <a:rPr sz="2200" b="0" i="0" u="none">
+                <a:solidFill>
+                  <a:schemeClr val="tx1"/>
+                </a:solidFill>
+                <a:latin typeface="Lohit Tamil Classical"/>
+                <a:ea typeface="Lohit Tamil Classical"/>
+                <a:cs typeface="Lohit Tamil Classical"/>
+              </a:rPr>
+              <a:t>стадии </a:t>
+            </a:r>
+            <a:r>
+              <a:rPr sz="2200" b="0" i="0" u="sng">
+                <a:solidFill>
+                  <a:schemeClr val="tx1"/>
+                </a:solidFill>
+                <a:latin typeface="Lohit Tamil Classical"/>
+                <a:ea typeface="Lohit Tamil Classical"/>
+                <a:cs typeface="Lohit Tamil Classical"/>
+              </a:rPr>
+              <a:t>не</a:t>
+            </a:r>
+            <a:r>
+              <a:rPr lang="ru-RU" sz="2200" b="0" i="0" u="none" strike="noStrike" cap="none" spc="0">
+                <a:solidFill>
+                  <a:schemeClr val="tx1"/>
+                </a:solidFill>
+                <a:latin typeface="Lohit Tamil Classical"/>
+                <a:ea typeface="Lohit Tamil Classical"/>
+                <a:cs typeface="Lohit Tamil Classical"/>
+              </a:rPr>
+              <a:t> </a:t>
+            </a:r>
+            <a:r>
+              <a:rPr sz="2200" b="0" i="0" u="none">
+                <a:solidFill>
+                  <a:schemeClr val="tx1"/>
+                </a:solidFill>
+                <a:latin typeface="Lohit Tamil Classical"/>
+                <a:ea typeface="Lohit Tamil Classical"/>
+                <a:cs typeface="Lohit Tamil Classical"/>
+              </a:rPr>
+              <a:t>даёт большой процент сухого остатка</a:t>
             </a:r>
             <a:endParaRPr sz="2200">
+              <a:solidFill>
+                <a:schemeClr val="tx1"/>
+              </a:solidFill>
               <a:latin typeface="Lohit Tamil Classical"/>
               <a:cs typeface="Lohit Tamil Classical"/>
             </a:endParaRPr>
@@ -5070,7 +6142,7 @@
         </p:nvSpPr>
         <p:spPr bwMode="auto">
           <a:xfrm flipH="0" flipV="0">
-            <a:off x="905847" y="838197"/>
+            <a:off x="905846" y="838197"/>
             <a:ext cx="9653210" cy="823319"/>
           </a:xfrm>
           <a:prstGeom prst="rect">
@@ -5089,7 +6161,7 @@
             <a:r>
               <a:rPr sz="4800" b="0" i="0" u="none">
                 <a:solidFill>
-                  <a:srgbClr val="1F1F1F"/>
+                  <a:schemeClr val="tx1"/>
                 </a:solidFill>
                 <a:latin typeface="Lohit Tamil Classical"/>
                 <a:ea typeface="Lohit Tamil Classical"/>
@@ -5098,6 +6170,9 @@
               <a:t>Регрессионное моделирование</a:t>
             </a:r>
             <a:endParaRPr sz="4800">
+              <a:solidFill>
+                <a:schemeClr val="tx1"/>
+              </a:solidFill>
               <a:latin typeface="Lohit Tamil Classical"/>
               <a:cs typeface="Lohit Tamil Classical"/>
             </a:endParaRPr>
@@ -5112,8 +6187,8 @@
         </p:nvSpPr>
         <p:spPr bwMode="auto">
           <a:xfrm flipH="0" flipV="0">
-            <a:off x="905847" y="2158183"/>
-            <a:ext cx="9864524" cy="3176375"/>
+            <a:off x="905845" y="2158182"/>
+            <a:ext cx="9870642" cy="3176349"/>
           </a:xfrm>
           <a:prstGeom prst="rect">
             <a:avLst/>
@@ -5135,13 +6210,41 @@
             </a:pPr>
             <a:r>
               <a:rPr sz="2200">
-                <a:latin typeface="Lohit Tamil Classical"/>
-                <a:ea typeface="Lohit Tamil Classical"/>
-                <a:cs typeface="Lohit Tamil Classical"/>
-              </a:rPr>
-              <a:t>Обучили модель, используя те факторы, которые больше всего влияют на долю опасного газа</a:t>
+                <a:solidFill>
+                  <a:schemeClr val="tx1"/>
+                </a:solidFill>
+                <a:latin typeface="Lohit Tamil Classical"/>
+                <a:ea typeface="Lohit Tamil Classical"/>
+                <a:cs typeface="Lohit Tamil Classical"/>
+              </a:rPr>
+              <a:t>Обучили модель, используя те факторы, которые больше всего влияют на</a:t>
+            </a:r>
+            <a:r>
+              <a:rPr lang="ru-RU" sz="2200" b="0" i="0" u="none" strike="noStrike" cap="none" spc="0">
+                <a:solidFill>
+                  <a:schemeClr val="tx1"/>
+                </a:solidFill>
+                <a:latin typeface="Lohit Tamil Classical"/>
+                <a:ea typeface="Lohit Tamil Classical"/>
+                <a:cs typeface="Lohit Tamil Classical"/>
+              </a:rPr>
+              <a:t> </a:t>
+            </a:r>
+            <a:r>
+              <a:rPr sz="2200">
+                <a:solidFill>
+                  <a:schemeClr val="tx1"/>
+                </a:solidFill>
+                <a:latin typeface="Lohit Tamil Classical"/>
+                <a:ea typeface="Lohit Tamil Classical"/>
+                <a:cs typeface="Lohit Tamil Classical"/>
+              </a:rPr>
+              <a:t>долю опасного газа</a:t>
             </a:r>
             <a:endParaRPr sz="2200">
+              <a:solidFill>
+                <a:schemeClr val="tx1"/>
+              </a:solidFill>
               <a:latin typeface="Lohit Tamil Classical"/>
               <a:ea typeface="Lohit Tamil Classical"/>
               <a:cs typeface="Lohit Tamil Classical"/>
@@ -5158,13 +6261,107 @@
             </a:pPr>
             <a:r>
               <a:rPr sz="2200">
-                <a:latin typeface="Lohit Tamil Classical"/>
-                <a:ea typeface="Lohit Tamil Classical"/>
-                <a:cs typeface="Lohit Tamil Classical"/>
-              </a:rPr>
-              <a:t>Оценили модель на метриках R2 и MAPE. Они равны соответственно 0.09 и 0.25</a:t>
+                <a:solidFill>
+                  <a:schemeClr val="tx1"/>
+                </a:solidFill>
+                <a:latin typeface="Lohit Tamil Classical"/>
+                <a:ea typeface="Lohit Tamil Classical"/>
+                <a:cs typeface="Lohit Tamil Classical"/>
+              </a:rPr>
+              <a:t>Оценили модель на метриках R2</a:t>
+            </a:r>
+            <a:r>
+              <a:rPr lang="ru-RU" sz="2200" b="0" i="0" u="none" strike="noStrike" cap="none" spc="0">
+                <a:solidFill>
+                  <a:schemeClr val="tx1"/>
+                </a:solidFill>
+                <a:latin typeface="Lohit Tamil Classical"/>
+                <a:ea typeface="Lohit Tamil Classical"/>
+                <a:cs typeface="Lohit Tamil Classical"/>
+              </a:rPr>
+              <a:t> </a:t>
+            </a:r>
+            <a:r>
+              <a:rPr sz="2200">
+                <a:solidFill>
+                  <a:schemeClr val="tx1"/>
+                </a:solidFill>
+                <a:latin typeface="Lohit Tamil Classical"/>
+                <a:ea typeface="Lohit Tamil Classical"/>
+                <a:cs typeface="Lohit Tamil Classical"/>
+              </a:rPr>
+              <a:t>и</a:t>
+            </a:r>
+            <a:r>
+              <a:rPr lang="ru-RU" sz="2200" b="0" i="0" u="none" strike="noStrike" cap="none" spc="0">
+                <a:solidFill>
+                  <a:schemeClr val="tx1"/>
+                </a:solidFill>
+                <a:latin typeface="Lohit Tamil Classical"/>
+                <a:ea typeface="Lohit Tamil Classical"/>
+                <a:cs typeface="Lohit Tamil Classical"/>
+              </a:rPr>
+              <a:t> </a:t>
+            </a:r>
+            <a:r>
+              <a:rPr sz="2200">
+                <a:solidFill>
+                  <a:schemeClr val="tx1"/>
+                </a:solidFill>
+                <a:latin typeface="Lohit Tamil Classical"/>
+                <a:ea typeface="Lohit Tamil Classical"/>
+                <a:cs typeface="Lohit Tamil Classical"/>
+              </a:rPr>
+              <a:t>MAPE. Они равны соответственно 0.09</a:t>
+            </a:r>
+            <a:r>
+              <a:rPr lang="ru-RU" sz="2200" b="0" i="0" u="none" strike="noStrike" cap="none" spc="0">
+                <a:solidFill>
+                  <a:schemeClr val="tx1"/>
+                </a:solidFill>
+                <a:latin typeface="Lohit Tamil Classical"/>
+                <a:ea typeface="Lohit Tamil Classical"/>
+                <a:cs typeface="Lohit Tamil Classical"/>
+              </a:rPr>
+              <a:t> </a:t>
+            </a:r>
+            <a:r>
+              <a:rPr sz="2200">
+                <a:solidFill>
+                  <a:schemeClr val="tx1"/>
+                </a:solidFill>
+                <a:latin typeface="Lohit Tamil Classical"/>
+                <a:ea typeface="Lohit Tamil Classical"/>
+                <a:cs typeface="Lohit Tamil Classical"/>
+              </a:rPr>
+              <a:t>и</a:t>
+            </a:r>
+            <a:r>
+              <a:rPr lang="ru-RU" sz="2200" b="0" i="0" u="none" strike="noStrike" cap="none" spc="0">
+                <a:solidFill>
+                  <a:schemeClr val="tx1"/>
+                </a:solidFill>
+                <a:latin typeface="Lohit Tamil Classical"/>
+                <a:ea typeface="Lohit Tamil Classical"/>
+                <a:cs typeface="Lohit Tamil Classical"/>
+              </a:rPr>
+              <a:t> </a:t>
+            </a:r>
+            <a:r>
+              <a:rPr sz="2200">
+                <a:solidFill>
+                  <a:schemeClr val="tx1"/>
+                </a:solidFill>
+                <a:latin typeface="Lohit Tamil Classical"/>
+                <a:ea typeface="Lohit Tamil Classical"/>
+                <a:cs typeface="Lohit Tamil Classical"/>
+              </a:rPr>
+              <a:t>0.25</a:t>
             </a:r>
             <a:endParaRPr sz="2200">
+              <a:solidFill>
+                <a:schemeClr val="tx1"/>
+              </a:solidFill>
               <a:latin typeface="Lohit Tamil Classical"/>
               <a:ea typeface="Lohit Tamil Classical"/>
               <a:cs typeface="Lohit Tamil Classical"/>
@@ -5181,13 +6378,85 @@
             </a:pPr>
             <a:r>
               <a:rPr sz="2200">
-                <a:latin typeface="Lohit Tamil Classical"/>
-                <a:ea typeface="Lohit Tamil Classical"/>
-                <a:cs typeface="Lohit Tamil Classical"/>
-              </a:rPr>
-              <a:t>Вывод: модель не может с необходимой точностью предсказать долю вредного газа, для улучшения её качества требуется больше данных, описывающих параметры, которые могут влиять на предсказываемые значения</a:t>
+                <a:solidFill>
+                  <a:schemeClr val="tx1"/>
+                </a:solidFill>
+                <a:latin typeface="Lohit Tamil Classical"/>
+                <a:ea typeface="Lohit Tamil Classical"/>
+                <a:cs typeface="Lohit Tamil Classical"/>
+              </a:rPr>
+              <a:t>Вывод: модель не может с необходимой точностью предсказать долю вредного газа, для</a:t>
+            </a:r>
+            <a:r>
+              <a:rPr lang="ru-RU" sz="2200" b="0" i="0" u="none" strike="noStrike" cap="none" spc="0">
+                <a:solidFill>
+                  <a:schemeClr val="tx1"/>
+                </a:solidFill>
+                <a:latin typeface="Lohit Tamil Classical"/>
+                <a:ea typeface="Lohit Tamil Classical"/>
+                <a:cs typeface="Lohit Tamil Classical"/>
+              </a:rPr>
+              <a:t> </a:t>
+            </a:r>
+            <a:r>
+              <a:rPr sz="2200">
+                <a:solidFill>
+                  <a:schemeClr val="tx1"/>
+                </a:solidFill>
+                <a:latin typeface="Lohit Tamil Classical"/>
+                <a:ea typeface="Lohit Tamil Classical"/>
+                <a:cs typeface="Lohit Tamil Classical"/>
+              </a:rPr>
+              <a:t>улучшения её</a:t>
+            </a:r>
+            <a:r>
+              <a:rPr lang="ru-RU" sz="2200" b="0" i="0" u="none" strike="noStrike" cap="none" spc="0">
+                <a:solidFill>
+                  <a:schemeClr val="tx1"/>
+                </a:solidFill>
+                <a:latin typeface="Lohit Tamil Classical"/>
+                <a:ea typeface="Lohit Tamil Classical"/>
+                <a:cs typeface="Lohit Tamil Classical"/>
+              </a:rPr>
+              <a:t> </a:t>
+            </a:r>
+            <a:r>
+              <a:rPr sz="2200">
+                <a:solidFill>
+                  <a:schemeClr val="tx1"/>
+                </a:solidFill>
+                <a:latin typeface="Lohit Tamil Classical"/>
+                <a:ea typeface="Lohit Tamil Classical"/>
+                <a:cs typeface="Lohit Tamil Classical"/>
+              </a:rPr>
+              <a:t>качества требуется больше данных, описывающих параметры, которые могут влиять на</a:t>
+            </a:r>
+            <a:r>
+              <a:rPr lang="ru-RU" sz="2200" b="0" i="0" u="none" strike="noStrike" cap="none" spc="0">
+                <a:solidFill>
+                  <a:schemeClr val="tx1"/>
+                </a:solidFill>
+                <a:latin typeface="Lohit Tamil Classical"/>
+                <a:ea typeface="Lohit Tamil Classical"/>
+                <a:cs typeface="Lohit Tamil Classical"/>
+              </a:rPr>
+              <a:t> </a:t>
+            </a:r>
+            <a:r>
+              <a:rPr sz="2200">
+                <a:solidFill>
+                  <a:schemeClr val="tx1"/>
+                </a:solidFill>
+                <a:latin typeface="Lohit Tamil Classical"/>
+                <a:ea typeface="Lohit Tamil Classical"/>
+                <a:cs typeface="Lohit Tamil Classical"/>
+              </a:rPr>
+              <a:t>предсказываемые значения</a:t>
             </a:r>
             <a:endParaRPr sz="2200">
+              <a:solidFill>
+                <a:schemeClr val="tx1"/>
+              </a:solidFill>
               <a:latin typeface="Lohit Tamil Classical"/>
               <a:cs typeface="Lohit Tamil Classical"/>
             </a:endParaRPr>
@@ -5253,7 +6522,7 @@
         </p:nvSpPr>
         <p:spPr bwMode="auto">
           <a:xfrm flipH="0" flipV="0">
-            <a:off x="905847" y="838197"/>
+            <a:off x="905846" y="838197"/>
             <a:ext cx="6106046" cy="823319"/>
           </a:xfrm>
           <a:prstGeom prst="rect">
@@ -5271,6 +6540,9 @@
             </a:pPr>
             <a:r>
               <a:rPr sz="4800">
+                <a:solidFill>
+                  <a:schemeClr val="tx1"/>
+                </a:solidFill>
                 <a:latin typeface="Lohit Tamil Classical"/>
                 <a:ea typeface="Lohit Tamil Classical"/>
                 <a:cs typeface="Lohit Tamil Classical"/>
@@ -5278,6 +6550,9 @@
               <a:t>Ссылка на дашборд</a:t>
             </a:r>
             <a:endParaRPr sz="4800">
+              <a:solidFill>
+                <a:schemeClr val="tx1"/>
+              </a:solidFill>
               <a:latin typeface="Lohit Tamil Classical"/>
               <a:cs typeface="Lohit Tamil Classical"/>
             </a:endParaRPr>
@@ -5292,8 +6567,8 @@
         </p:nvSpPr>
         <p:spPr bwMode="auto">
           <a:xfrm flipH="0" flipV="0">
-            <a:off x="905847" y="2158183"/>
-            <a:ext cx="9865964" cy="427079"/>
+            <a:off x="905846" y="2158182"/>
+            <a:ext cx="9866323" cy="427079"/>
           </a:xfrm>
           <a:prstGeom prst="rect">
             <a:avLst/>
@@ -5311,7 +6586,7 @@
             <a:r>
               <a:rPr sz="2200" u="sng">
                 <a:solidFill>
-                  <a:schemeClr val="hlink"/>
+                  <a:schemeClr val="tx1"/>
                 </a:solidFill>
                 <a:latin typeface="Lohit Tamil Classical"/>
                 <a:ea typeface="Lohit Tamil Classical"/>
@@ -5321,6 +6596,9 @@
               <a:t>https://datalens.yandex/4el0ofqoxksgq</a:t>
             </a:r>
             <a:endParaRPr sz="2200">
+              <a:solidFill>
+                <a:schemeClr val="tx1"/>
+              </a:solidFill>
               <a:latin typeface="Lohit Tamil Classical"/>
               <a:cs typeface="Lohit Tamil Classical"/>
             </a:endParaRPr>

</xml_diff>